<commit_message>
TW edits, "Partner Solution"->"AWS Solution"
</commit_message>
<xml_diff>
--- a/docs/deployment_guide/images/architecture_diagram.pptx
+++ b/docs/deployment_guide/images/architecture_diagram.pptx
@@ -7,6 +7,8 @@
   <p:sldIdLst>
     <p:sldId id="256" r:id="rId2"/>
     <p:sldId id="257" r:id="rId3"/>
+    <p:sldId id="259" r:id="rId4"/>
+    <p:sldId id="258" r:id="rId5"/>
   </p:sldIdLst>
   <p:sldSz cx="15544800" cy="10058400"/>
   <p:notesSz cx="6858000" cy="9144000"/>
@@ -10019,6 +10021,3212 @@
 </p:sld>
 </file>
 
+<file path=ppt/slides/slide3.xml><?xml version="1.0" encoding="utf-8"?>
+<p:sld xmlns:a="http://schemas.openxmlformats.org/drawingml/2006/main" xmlns:r="http://schemas.openxmlformats.org/officeDocument/2006/relationships" xmlns:p="http://schemas.openxmlformats.org/presentationml/2006/main">
+  <p:cSld>
+    <p:spTree>
+      <p:nvGrpSpPr>
+        <p:cNvPr id="1" name=""/>
+        <p:cNvGrpSpPr/>
+        <p:nvPr/>
+      </p:nvGrpSpPr>
+      <p:grpSpPr>
+        <a:xfrm>
+          <a:off x="0" y="0"/>
+          <a:ext cx="0" cy="0"/>
+          <a:chOff x="0" y="0"/>
+          <a:chExt cx="0" cy="0"/>
+        </a:xfrm>
+      </p:grpSpPr>
+      <p:sp>
+        <p:nvSpPr>
+          <p:cNvPr id="11" name="Rectangle 10">
+            <a:extLst>
+              <a:ext uri="{FF2B5EF4-FFF2-40B4-BE49-F238E27FC236}">
+                <a16:creationId xmlns:a16="http://schemas.microsoft.com/office/drawing/2014/main" id="{59B4B624-31F2-4FA7-BC4D-69C0E4528346}"/>
+              </a:ext>
+            </a:extLst>
+          </p:cNvPr>
+          <p:cNvSpPr/>
+          <p:nvPr/>
+        </p:nvSpPr>
+        <p:spPr>
+          <a:xfrm>
+            <a:off x="9750390" y="2273808"/>
+            <a:ext cx="1371600" cy="4233631"/>
+          </a:xfrm>
+          <a:prstGeom prst="rect">
+            <a:avLst/>
+          </a:prstGeom>
+          <a:solidFill>
+            <a:srgbClr val="5A6B86">
+              <a:alpha val="9804"/>
+            </a:srgbClr>
+          </a:solidFill>
+          <a:ln w="12700">
+            <a:noFill/>
+            <a:prstDash val="dash"/>
+          </a:ln>
+        </p:spPr>
+        <p:style>
+          <a:lnRef idx="2">
+            <a:schemeClr val="accent1">
+              <a:shade val="50000"/>
+            </a:schemeClr>
+          </a:lnRef>
+          <a:fillRef idx="1">
+            <a:schemeClr val="accent1"/>
+          </a:fillRef>
+          <a:effectRef idx="0">
+            <a:schemeClr val="accent1"/>
+          </a:effectRef>
+          <a:fontRef idx="minor">
+            <a:schemeClr val="lt1"/>
+          </a:fontRef>
+        </p:style>
+        <p:txBody>
+          <a:bodyPr tIns="91440"/>
+          <a:lstStyle/>
+          <a:p>
+            <a:pPr algn="ctr" eaLnBrk="1" fontAlgn="auto" hangingPunct="1">
+              <a:spcBef>
+                <a:spcPts val="0"/>
+              </a:spcBef>
+              <a:spcAft>
+                <a:spcPts val="0"/>
+              </a:spcAft>
+              <a:defRPr/>
+            </a:pPr>
+            <a:r>
+              <a:rPr lang="en-US" sz="1200" dirty="0">
+                <a:solidFill>
+                  <a:schemeClr val="tx1"/>
+                </a:solidFill>
+                <a:latin typeface="Arial" panose="020B0604020202020204" pitchFamily="34" charset="0"/>
+                <a:cs typeface="Arial" panose="020B0604020202020204" pitchFamily="34" charset="0"/>
+              </a:rPr>
+              <a:t>Deploy stage</a:t>
+            </a:r>
+          </a:p>
+        </p:txBody>
+      </p:sp>
+      <p:sp>
+        <p:nvSpPr>
+          <p:cNvPr id="9" name="Rectangle 8">
+            <a:extLst>
+              <a:ext uri="{FF2B5EF4-FFF2-40B4-BE49-F238E27FC236}">
+                <a16:creationId xmlns:a16="http://schemas.microsoft.com/office/drawing/2014/main" id="{91C0E7B6-6F67-4D3D-AEA3-C48B7690F269}"/>
+              </a:ext>
+            </a:extLst>
+          </p:cNvPr>
+          <p:cNvSpPr/>
+          <p:nvPr/>
+        </p:nvSpPr>
+        <p:spPr>
+          <a:xfrm>
+            <a:off x="4775224" y="2273808"/>
+            <a:ext cx="1371600" cy="4233631"/>
+          </a:xfrm>
+          <a:prstGeom prst="rect">
+            <a:avLst/>
+          </a:prstGeom>
+          <a:solidFill>
+            <a:srgbClr val="5A6B86">
+              <a:alpha val="9804"/>
+            </a:srgbClr>
+          </a:solidFill>
+          <a:ln w="12700">
+            <a:noFill/>
+            <a:prstDash val="dash"/>
+          </a:ln>
+        </p:spPr>
+        <p:style>
+          <a:lnRef idx="2">
+            <a:schemeClr val="accent1">
+              <a:shade val="50000"/>
+            </a:schemeClr>
+          </a:lnRef>
+          <a:fillRef idx="1">
+            <a:schemeClr val="accent1"/>
+          </a:fillRef>
+          <a:effectRef idx="0">
+            <a:schemeClr val="accent1"/>
+          </a:effectRef>
+          <a:fontRef idx="minor">
+            <a:schemeClr val="lt1"/>
+          </a:fontRef>
+        </p:style>
+        <p:txBody>
+          <a:bodyPr tIns="91440"/>
+          <a:lstStyle/>
+          <a:p>
+            <a:pPr algn="ctr" eaLnBrk="1" fontAlgn="auto" hangingPunct="1">
+              <a:spcBef>
+                <a:spcPts val="0"/>
+              </a:spcBef>
+              <a:spcAft>
+                <a:spcPts val="0"/>
+              </a:spcAft>
+              <a:defRPr/>
+            </a:pPr>
+            <a:r>
+              <a:rPr lang="en-US" sz="1200" dirty="0">
+                <a:solidFill>
+                  <a:schemeClr val="tx1"/>
+                </a:solidFill>
+                <a:latin typeface="Arial" panose="020B0604020202020204" pitchFamily="34" charset="0"/>
+                <a:cs typeface="Arial" panose="020B0604020202020204" pitchFamily="34" charset="0"/>
+              </a:rPr>
+              <a:t>Source stage</a:t>
+            </a:r>
+          </a:p>
+        </p:txBody>
+      </p:sp>
+      <p:sp>
+        <p:nvSpPr>
+          <p:cNvPr id="10" name="Rectangle 9">
+            <a:extLst>
+              <a:ext uri="{FF2B5EF4-FFF2-40B4-BE49-F238E27FC236}">
+                <a16:creationId xmlns:a16="http://schemas.microsoft.com/office/drawing/2014/main" id="{B9B4BAD8-17CB-4352-A0E8-5A2996D43194}"/>
+              </a:ext>
+            </a:extLst>
+          </p:cNvPr>
+          <p:cNvSpPr/>
+          <p:nvPr/>
+        </p:nvSpPr>
+        <p:spPr>
+          <a:xfrm>
+            <a:off x="6608402" y="2273808"/>
+            <a:ext cx="2677565" cy="4233631"/>
+          </a:xfrm>
+          <a:prstGeom prst="rect">
+            <a:avLst/>
+          </a:prstGeom>
+          <a:solidFill>
+            <a:srgbClr val="5A6B86">
+              <a:alpha val="9804"/>
+            </a:srgbClr>
+          </a:solidFill>
+          <a:ln w="12700">
+            <a:noFill/>
+            <a:prstDash val="dash"/>
+          </a:ln>
+        </p:spPr>
+        <p:style>
+          <a:lnRef idx="2">
+            <a:schemeClr val="accent1">
+              <a:shade val="50000"/>
+            </a:schemeClr>
+          </a:lnRef>
+          <a:fillRef idx="1">
+            <a:schemeClr val="accent1"/>
+          </a:fillRef>
+          <a:effectRef idx="0">
+            <a:schemeClr val="accent1"/>
+          </a:effectRef>
+          <a:fontRef idx="minor">
+            <a:schemeClr val="lt1"/>
+          </a:fontRef>
+        </p:style>
+        <p:txBody>
+          <a:bodyPr tIns="91440"/>
+          <a:lstStyle/>
+          <a:p>
+            <a:pPr algn="ctr" eaLnBrk="1" fontAlgn="auto" hangingPunct="1">
+              <a:spcBef>
+                <a:spcPts val="0"/>
+              </a:spcBef>
+              <a:spcAft>
+                <a:spcPts val="0"/>
+              </a:spcAft>
+              <a:defRPr/>
+            </a:pPr>
+            <a:r>
+              <a:rPr lang="en-US" sz="1200" dirty="0">
+                <a:solidFill>
+                  <a:schemeClr val="tx1"/>
+                </a:solidFill>
+                <a:latin typeface="Arial" panose="020B0604020202020204" pitchFamily="34" charset="0"/>
+                <a:cs typeface="Arial" panose="020B0604020202020204" pitchFamily="34" charset="0"/>
+              </a:rPr>
+              <a:t>Build/test stage</a:t>
+            </a:r>
+          </a:p>
+        </p:txBody>
+      </p:sp>
+      <p:sp>
+        <p:nvSpPr>
+          <p:cNvPr id="4" name="Rectangle 3">
+            <a:extLst>
+              <a:ext uri="{FF2B5EF4-FFF2-40B4-BE49-F238E27FC236}">
+                <a16:creationId xmlns:a16="http://schemas.microsoft.com/office/drawing/2014/main" id="{8AE7A71C-DEDB-44C0-AC3D-0A1048293682}"/>
+              </a:ext>
+            </a:extLst>
+          </p:cNvPr>
+          <p:cNvSpPr/>
+          <p:nvPr/>
+        </p:nvSpPr>
+        <p:spPr>
+          <a:xfrm>
+            <a:off x="4008578" y="1312433"/>
+            <a:ext cx="7789433" cy="5582135"/>
+          </a:xfrm>
+          <a:prstGeom prst="rect">
+            <a:avLst/>
+          </a:prstGeom>
+          <a:noFill/>
+          <a:ln w="12700">
+            <a:solidFill>
+              <a:schemeClr val="tx1"/>
+            </a:solidFill>
+          </a:ln>
+        </p:spPr>
+        <p:style>
+          <a:lnRef idx="2">
+            <a:schemeClr val="accent1">
+              <a:shade val="50000"/>
+            </a:schemeClr>
+          </a:lnRef>
+          <a:fillRef idx="1">
+            <a:schemeClr val="accent1"/>
+          </a:fillRef>
+          <a:effectRef idx="0">
+            <a:schemeClr val="accent1"/>
+          </a:effectRef>
+          <a:fontRef idx="minor">
+            <a:schemeClr val="lt1"/>
+          </a:fontRef>
+        </p:style>
+        <p:txBody>
+          <a:bodyPr lIns="502920" tIns="91440"/>
+          <a:lstStyle/>
+          <a:p>
+            <a:pPr eaLnBrk="1" fontAlgn="auto" hangingPunct="1">
+              <a:spcBef>
+                <a:spcPts val="0"/>
+              </a:spcBef>
+              <a:spcAft>
+                <a:spcPts val="0"/>
+              </a:spcAft>
+              <a:defRPr/>
+            </a:pPr>
+            <a:r>
+              <a:rPr lang="en-US" sz="1200" dirty="0">
+                <a:solidFill>
+                  <a:sysClr val="windowText" lastClr="000000"/>
+                </a:solidFill>
+                <a:latin typeface="Arial" panose="020B0604020202020204" pitchFamily="34" charset="0"/>
+                <a:cs typeface="Arial" panose="020B0604020202020204" pitchFamily="34" charset="0"/>
+              </a:rPr>
+              <a:t>AWS Cloud</a:t>
+            </a:r>
+          </a:p>
+        </p:txBody>
+      </p:sp>
+      <p:pic>
+        <p:nvPicPr>
+          <p:cNvPr id="5" name="Graphic 4">
+            <a:extLst>
+              <a:ext uri="{FF2B5EF4-FFF2-40B4-BE49-F238E27FC236}">
+                <a16:creationId xmlns:a16="http://schemas.microsoft.com/office/drawing/2014/main" id="{0CBE4B98-70B6-49BB-8A20-FBF6B087FF74}"/>
+              </a:ext>
+            </a:extLst>
+          </p:cNvPr>
+          <p:cNvPicPr>
+            <a:picLocks noChangeAspect="1"/>
+          </p:cNvPicPr>
+          <p:nvPr/>
+        </p:nvPicPr>
+        <p:blipFill>
+          <a:blip r:embed="rId2">
+            <a:extLst>
+              <a:ext uri="{96DAC541-7B7A-43D3-8B79-37D633B846F1}">
+                <asvg:svgBlip xmlns:asvg="http://schemas.microsoft.com/office/drawing/2016/SVG/main" r:embed="rId3"/>
+              </a:ext>
+            </a:extLst>
+          </a:blip>
+          <a:srcRect/>
+          <a:stretch/>
+        </p:blipFill>
+        <p:spPr>
+          <a:xfrm>
+            <a:off x="4008577" y="1312434"/>
+            <a:ext cx="381000" cy="381000"/>
+          </a:xfrm>
+          <a:prstGeom prst="rect">
+            <a:avLst/>
+          </a:prstGeom>
+        </p:spPr>
+      </p:pic>
+      <p:sp>
+        <p:nvSpPr>
+          <p:cNvPr id="6" name="Rectangle 5">
+            <a:extLst>
+              <a:ext uri="{FF2B5EF4-FFF2-40B4-BE49-F238E27FC236}">
+                <a16:creationId xmlns:a16="http://schemas.microsoft.com/office/drawing/2014/main" id="{F0EA4DF2-4E1A-4AB5-AF82-FD592EC0A8F6}"/>
+              </a:ext>
+            </a:extLst>
+          </p:cNvPr>
+          <p:cNvSpPr/>
+          <p:nvPr/>
+        </p:nvSpPr>
+        <p:spPr>
+          <a:xfrm>
+            <a:off x="4307706" y="1838782"/>
+            <a:ext cx="7213734" cy="4796368"/>
+          </a:xfrm>
+          <a:prstGeom prst="rect">
+            <a:avLst/>
+          </a:prstGeom>
+          <a:noFill/>
+          <a:ln w="12700">
+            <a:solidFill>
+              <a:srgbClr val="3A47CB"/>
+            </a:solidFill>
+          </a:ln>
+        </p:spPr>
+        <p:style>
+          <a:lnRef idx="2">
+            <a:schemeClr val="accent1">
+              <a:shade val="50000"/>
+            </a:schemeClr>
+          </a:lnRef>
+          <a:fillRef idx="1">
+            <a:schemeClr val="accent1"/>
+          </a:fillRef>
+          <a:effectRef idx="0">
+            <a:schemeClr val="accent1"/>
+          </a:effectRef>
+          <a:fontRef idx="minor">
+            <a:schemeClr val="lt1"/>
+          </a:fontRef>
+        </p:style>
+        <p:txBody>
+          <a:bodyPr lIns="502920" tIns="91440"/>
+          <a:lstStyle/>
+          <a:p>
+            <a:pPr eaLnBrk="1" fontAlgn="auto" hangingPunct="1">
+              <a:spcBef>
+                <a:spcPts val="0"/>
+              </a:spcBef>
+              <a:spcAft>
+                <a:spcPts val="0"/>
+              </a:spcAft>
+              <a:defRPr/>
+            </a:pPr>
+            <a:r>
+              <a:rPr lang="en-US" sz="1200" dirty="0">
+                <a:solidFill>
+                  <a:srgbClr val="3A47CB"/>
+                </a:solidFill>
+                <a:latin typeface="Arial" panose="020B0604020202020204" pitchFamily="34" charset="0"/>
+                <a:cs typeface="Arial" panose="020B0604020202020204" pitchFamily="34" charset="0"/>
+              </a:rPr>
+              <a:t>AWS CodePipeline pipeline </a:t>
+            </a:r>
+          </a:p>
+        </p:txBody>
+      </p:sp>
+      <p:pic>
+        <p:nvPicPr>
+          <p:cNvPr id="7" name="Graphic 6">
+            <a:extLst>
+              <a:ext uri="{FF2B5EF4-FFF2-40B4-BE49-F238E27FC236}">
+                <a16:creationId xmlns:a16="http://schemas.microsoft.com/office/drawing/2014/main" id="{63FAE67E-62E3-4D91-B895-7A66BB4E426D}"/>
+              </a:ext>
+            </a:extLst>
+          </p:cNvPr>
+          <p:cNvPicPr>
+            <a:picLocks noChangeAspect="1"/>
+          </p:cNvPicPr>
+          <p:nvPr/>
+        </p:nvPicPr>
+        <p:blipFill>
+          <a:blip r:embed="rId4">
+            <a:extLst>
+              <a:ext uri="{28A0092B-C50C-407E-A947-70E740481C1C}">
+                <a14:useLocalDpi xmlns:a14="http://schemas.microsoft.com/office/drawing/2010/main" val="0"/>
+              </a:ext>
+              <a:ext uri="{96DAC541-7B7A-43D3-8B79-37D633B846F1}">
+                <asvg:svgBlip xmlns:asvg="http://schemas.microsoft.com/office/drawing/2016/SVG/main" r:embed="rId5"/>
+              </a:ext>
+            </a:extLst>
+          </a:blip>
+          <a:srcRect/>
+          <a:stretch/>
+        </p:blipFill>
+        <p:spPr>
+          <a:xfrm>
+            <a:off x="4307705" y="1835058"/>
+            <a:ext cx="381000" cy="381000"/>
+          </a:xfrm>
+          <a:prstGeom prst="rect">
+            <a:avLst/>
+          </a:prstGeom>
+        </p:spPr>
+      </p:pic>
+      <p:cxnSp>
+        <p:nvCxnSpPr>
+          <p:cNvPr id="18" name="Straight Arrow Connector 17">
+            <a:extLst>
+              <a:ext uri="{FF2B5EF4-FFF2-40B4-BE49-F238E27FC236}">
+                <a16:creationId xmlns:a16="http://schemas.microsoft.com/office/drawing/2014/main" id="{1CD659C2-1FD8-4E84-8DB6-D6EC49C494E5}"/>
+              </a:ext>
+            </a:extLst>
+          </p:cNvPr>
+          <p:cNvCxnSpPr>
+            <a:cxnSpLocks/>
+            <a:stCxn id="42" idx="3"/>
+            <a:endCxn id="9" idx="1"/>
+          </p:cNvCxnSpPr>
+          <p:nvPr/>
+        </p:nvCxnSpPr>
+        <p:spPr>
+          <a:xfrm>
+            <a:off x="3059730" y="4390623"/>
+            <a:ext cx="1715494" cy="1"/>
+          </a:xfrm>
+          <a:prstGeom prst="straightConnector1">
+            <a:avLst/>
+          </a:prstGeom>
+          <a:ln w="12700">
+            <a:solidFill>
+              <a:srgbClr val="545B64"/>
+            </a:solidFill>
+            <a:headEnd type="none" w="med" len="sm"/>
+            <a:tailEnd type="arrow" w="med" len="sm"/>
+          </a:ln>
+        </p:spPr>
+        <p:style>
+          <a:lnRef idx="1">
+            <a:schemeClr val="accent1"/>
+          </a:lnRef>
+          <a:fillRef idx="0">
+            <a:schemeClr val="accent1"/>
+          </a:fillRef>
+          <a:effectRef idx="0">
+            <a:schemeClr val="accent1"/>
+          </a:effectRef>
+          <a:fontRef idx="minor">
+            <a:schemeClr val="tx1"/>
+          </a:fontRef>
+        </p:style>
+      </p:cxnSp>
+      <p:sp>
+        <p:nvSpPr>
+          <p:cNvPr id="23" name="TextBox 20">
+            <a:extLst>
+              <a:ext uri="{FF2B5EF4-FFF2-40B4-BE49-F238E27FC236}">
+                <a16:creationId xmlns:a16="http://schemas.microsoft.com/office/drawing/2014/main" id="{8388EF1A-100A-4D71-AC5D-360E44903ADA}"/>
+              </a:ext>
+            </a:extLst>
+          </p:cNvPr>
+          <p:cNvSpPr txBox="1">
+            <a:spLocks noChangeArrowheads="1"/>
+          </p:cNvSpPr>
+          <p:nvPr/>
+        </p:nvSpPr>
+        <p:spPr bwMode="auto">
+          <a:xfrm>
+            <a:off x="2362237" y="4668189"/>
+            <a:ext cx="939073" cy="461665"/>
+          </a:xfrm>
+          <a:prstGeom prst="rect">
+            <a:avLst/>
+          </a:prstGeom>
+          <a:noFill/>
+          <a:ln>
+            <a:noFill/>
+          </a:ln>
+          <a:extLst>
+            <a:ext uri="{909E8E84-426E-40DD-AFC4-6F175D3DCCD1}">
+              <a14:hiddenFill xmlns:a14="http://schemas.microsoft.com/office/drawing/2010/main">
+                <a:solidFill>
+                  <a:srgbClr val="FFFFFF"/>
+                </a:solidFill>
+              </a14:hiddenFill>
+            </a:ext>
+            <a:ext uri="{91240B29-F687-4F45-9708-019B960494DF}">
+              <a14:hiddenLine xmlns:a14="http://schemas.microsoft.com/office/drawing/2010/main" w="9525">
+                <a:solidFill>
+                  <a:srgbClr val="000000"/>
+                </a:solidFill>
+                <a:miter lim="800000"/>
+                <a:headEnd/>
+                <a:tailEnd/>
+              </a14:hiddenLine>
+            </a:ext>
+          </a:extLst>
+        </p:spPr>
+        <p:txBody>
+          <a:bodyPr wrap="square">
+            <a:spAutoFit/>
+          </a:bodyPr>
+          <a:lstStyle>
+            <a:lvl1pPr>
+              <a:defRPr>
+                <a:solidFill>
+                  <a:schemeClr val="tx1"/>
+                </a:solidFill>
+                <a:latin typeface="Calibri" panose="020F0502020204030204" pitchFamily="34" charset="0"/>
+              </a:defRPr>
+            </a:lvl1pPr>
+            <a:lvl2pPr marL="742950" indent="-285750">
+              <a:defRPr>
+                <a:solidFill>
+                  <a:schemeClr val="tx1"/>
+                </a:solidFill>
+                <a:latin typeface="Calibri" panose="020F0502020204030204" pitchFamily="34" charset="0"/>
+              </a:defRPr>
+            </a:lvl2pPr>
+            <a:lvl3pPr marL="1143000" indent="-228600">
+              <a:defRPr>
+                <a:solidFill>
+                  <a:schemeClr val="tx1"/>
+                </a:solidFill>
+                <a:latin typeface="Calibri" panose="020F0502020204030204" pitchFamily="34" charset="0"/>
+              </a:defRPr>
+            </a:lvl3pPr>
+            <a:lvl4pPr marL="1600200" indent="-228600">
+              <a:defRPr>
+                <a:solidFill>
+                  <a:schemeClr val="tx1"/>
+                </a:solidFill>
+                <a:latin typeface="Calibri" panose="020F0502020204030204" pitchFamily="34" charset="0"/>
+              </a:defRPr>
+            </a:lvl4pPr>
+            <a:lvl5pPr marL="2057400" indent="-228600">
+              <a:defRPr>
+                <a:solidFill>
+                  <a:schemeClr val="tx1"/>
+                </a:solidFill>
+                <a:latin typeface="Calibri" panose="020F0502020204030204" pitchFamily="34" charset="0"/>
+              </a:defRPr>
+            </a:lvl5pPr>
+            <a:lvl6pPr marL="2514600" indent="-228600" eaLnBrk="0" fontAlgn="base" hangingPunct="0">
+              <a:spcBef>
+                <a:spcPct val="0"/>
+              </a:spcBef>
+              <a:spcAft>
+                <a:spcPct val="0"/>
+              </a:spcAft>
+              <a:defRPr>
+                <a:solidFill>
+                  <a:schemeClr val="tx1"/>
+                </a:solidFill>
+                <a:latin typeface="Calibri" panose="020F0502020204030204" pitchFamily="34" charset="0"/>
+              </a:defRPr>
+            </a:lvl6pPr>
+            <a:lvl7pPr marL="2971800" indent="-228600" eaLnBrk="0" fontAlgn="base" hangingPunct="0">
+              <a:spcBef>
+                <a:spcPct val="0"/>
+              </a:spcBef>
+              <a:spcAft>
+                <a:spcPct val="0"/>
+              </a:spcAft>
+              <a:defRPr>
+                <a:solidFill>
+                  <a:schemeClr val="tx1"/>
+                </a:solidFill>
+                <a:latin typeface="Calibri" panose="020F0502020204030204" pitchFamily="34" charset="0"/>
+              </a:defRPr>
+            </a:lvl7pPr>
+            <a:lvl8pPr marL="3429000" indent="-228600" eaLnBrk="0" fontAlgn="base" hangingPunct="0">
+              <a:spcBef>
+                <a:spcPct val="0"/>
+              </a:spcBef>
+              <a:spcAft>
+                <a:spcPct val="0"/>
+              </a:spcAft>
+              <a:defRPr>
+                <a:solidFill>
+                  <a:schemeClr val="tx1"/>
+                </a:solidFill>
+                <a:latin typeface="Calibri" panose="020F0502020204030204" pitchFamily="34" charset="0"/>
+              </a:defRPr>
+            </a:lvl8pPr>
+            <a:lvl9pPr marL="3886200" indent="-228600" eaLnBrk="0" fontAlgn="base" hangingPunct="0">
+              <a:spcBef>
+                <a:spcPct val="0"/>
+              </a:spcBef>
+              <a:spcAft>
+                <a:spcPct val="0"/>
+              </a:spcAft>
+              <a:defRPr>
+                <a:solidFill>
+                  <a:schemeClr val="tx1"/>
+                </a:solidFill>
+                <a:latin typeface="Calibri" panose="020F0502020204030204" pitchFamily="34" charset="0"/>
+              </a:defRPr>
+            </a:lvl9pPr>
+          </a:lstStyle>
+          <a:p>
+            <a:pPr algn="ctr" eaLnBrk="1" hangingPunct="1"/>
+            <a:r>
+              <a:rPr lang="en-US" altLang="en-US" sz="1200" dirty="0">
+                <a:latin typeface="Arial" panose="020B0604020202020204" pitchFamily="34" charset="0"/>
+                <a:ea typeface="Amazon Ember" panose="020B0603020204020204" pitchFamily="34" charset="0"/>
+                <a:cs typeface="Arial" panose="020B0604020202020204" pitchFamily="34" charset="0"/>
+              </a:rPr>
+              <a:t>GitHub</a:t>
+            </a:r>
+          </a:p>
+          <a:p>
+            <a:pPr algn="ctr" eaLnBrk="1" hangingPunct="1"/>
+            <a:r>
+              <a:rPr lang="en-US" altLang="en-US" sz="1200" dirty="0">
+                <a:latin typeface="Arial" panose="020B0604020202020204" pitchFamily="34" charset="0"/>
+                <a:ea typeface="Amazon Ember" panose="020B0603020204020204" pitchFamily="34" charset="0"/>
+                <a:cs typeface="Arial" panose="020B0604020202020204" pitchFamily="34" charset="0"/>
+              </a:rPr>
+              <a:t>repository</a:t>
+            </a:r>
+          </a:p>
+        </p:txBody>
+      </p:sp>
+      <p:cxnSp>
+        <p:nvCxnSpPr>
+          <p:cNvPr id="29" name="Straight Arrow Connector 28">
+            <a:extLst>
+              <a:ext uri="{FF2B5EF4-FFF2-40B4-BE49-F238E27FC236}">
+                <a16:creationId xmlns:a16="http://schemas.microsoft.com/office/drawing/2014/main" id="{B03F8DD2-329F-4815-8954-1F462277BC01}"/>
+              </a:ext>
+            </a:extLst>
+          </p:cNvPr>
+          <p:cNvCxnSpPr>
+            <a:cxnSpLocks/>
+            <a:stCxn id="9" idx="3"/>
+            <a:endCxn id="10" idx="1"/>
+          </p:cNvCxnSpPr>
+          <p:nvPr/>
+        </p:nvCxnSpPr>
+        <p:spPr>
+          <a:xfrm>
+            <a:off x="6146824" y="4390624"/>
+            <a:ext cx="461578" cy="0"/>
+          </a:xfrm>
+          <a:prstGeom prst="straightConnector1">
+            <a:avLst/>
+          </a:prstGeom>
+          <a:ln w="12700">
+            <a:solidFill>
+              <a:srgbClr val="545B64"/>
+            </a:solidFill>
+            <a:headEnd type="none" w="med" len="sm"/>
+            <a:tailEnd type="arrow" w="med" len="sm"/>
+          </a:ln>
+        </p:spPr>
+        <p:style>
+          <a:lnRef idx="1">
+            <a:schemeClr val="accent1"/>
+          </a:lnRef>
+          <a:fillRef idx="0">
+            <a:schemeClr val="accent1"/>
+          </a:fillRef>
+          <a:effectRef idx="0">
+            <a:schemeClr val="accent1"/>
+          </a:effectRef>
+          <a:fontRef idx="minor">
+            <a:schemeClr val="tx1"/>
+          </a:fontRef>
+        </p:style>
+      </p:cxnSp>
+      <p:cxnSp>
+        <p:nvCxnSpPr>
+          <p:cNvPr id="32" name="Straight Arrow Connector 31">
+            <a:extLst>
+              <a:ext uri="{FF2B5EF4-FFF2-40B4-BE49-F238E27FC236}">
+                <a16:creationId xmlns:a16="http://schemas.microsoft.com/office/drawing/2014/main" id="{E398DA28-ECC5-4DCC-8DA3-7A5DAF4FEAE4}"/>
+              </a:ext>
+            </a:extLst>
+          </p:cNvPr>
+          <p:cNvCxnSpPr>
+            <a:cxnSpLocks/>
+            <a:stCxn id="10" idx="3"/>
+            <a:endCxn id="11" idx="1"/>
+          </p:cNvCxnSpPr>
+          <p:nvPr/>
+        </p:nvCxnSpPr>
+        <p:spPr>
+          <a:xfrm>
+            <a:off x="9285967" y="4390624"/>
+            <a:ext cx="464423" cy="0"/>
+          </a:xfrm>
+          <a:prstGeom prst="straightConnector1">
+            <a:avLst/>
+          </a:prstGeom>
+          <a:ln w="12700">
+            <a:solidFill>
+              <a:srgbClr val="545B64"/>
+            </a:solidFill>
+            <a:headEnd type="none" w="med" len="sm"/>
+            <a:tailEnd type="arrow" w="med" len="sm"/>
+          </a:ln>
+        </p:spPr>
+        <p:style>
+          <a:lnRef idx="1">
+            <a:schemeClr val="accent1"/>
+          </a:lnRef>
+          <a:fillRef idx="0">
+            <a:schemeClr val="accent1"/>
+          </a:fillRef>
+          <a:effectRef idx="0">
+            <a:schemeClr val="accent1"/>
+          </a:effectRef>
+          <a:fontRef idx="minor">
+            <a:schemeClr val="tx1"/>
+          </a:fontRef>
+        </p:style>
+      </p:cxnSp>
+      <p:sp>
+        <p:nvSpPr>
+          <p:cNvPr id="37" name="TextBox 20">
+            <a:extLst>
+              <a:ext uri="{FF2B5EF4-FFF2-40B4-BE49-F238E27FC236}">
+                <a16:creationId xmlns:a16="http://schemas.microsoft.com/office/drawing/2014/main" id="{117209E7-3460-4BD7-8075-D409632E34D5}"/>
+              </a:ext>
+            </a:extLst>
+          </p:cNvPr>
+          <p:cNvSpPr txBox="1">
+            <a:spLocks noChangeArrowheads="1"/>
+          </p:cNvSpPr>
+          <p:nvPr/>
+        </p:nvSpPr>
+        <p:spPr bwMode="auto">
+          <a:xfrm>
+            <a:off x="6868327" y="5985779"/>
+            <a:ext cx="1293490" cy="261610"/>
+          </a:xfrm>
+          <a:prstGeom prst="rect">
+            <a:avLst/>
+          </a:prstGeom>
+          <a:noFill/>
+          <a:ln>
+            <a:noFill/>
+          </a:ln>
+          <a:extLst>
+            <a:ext uri="{909E8E84-426E-40DD-AFC4-6F175D3DCCD1}">
+              <a14:hiddenFill xmlns:a14="http://schemas.microsoft.com/office/drawing/2010/main">
+                <a:solidFill>
+                  <a:srgbClr val="FFFFFF"/>
+                </a:solidFill>
+              </a14:hiddenFill>
+            </a:ext>
+            <a:ext uri="{91240B29-F687-4F45-9708-019B960494DF}">
+              <a14:hiddenLine xmlns:a14="http://schemas.microsoft.com/office/drawing/2010/main" w="9525">
+                <a:solidFill>
+                  <a:srgbClr val="000000"/>
+                </a:solidFill>
+                <a:miter lim="800000"/>
+                <a:headEnd/>
+                <a:tailEnd/>
+              </a14:hiddenLine>
+            </a:ext>
+          </a:extLst>
+        </p:spPr>
+        <p:txBody>
+          <a:bodyPr wrap="square">
+            <a:spAutoFit/>
+          </a:bodyPr>
+          <a:lstStyle>
+            <a:lvl1pPr>
+              <a:defRPr>
+                <a:solidFill>
+                  <a:schemeClr val="tx1"/>
+                </a:solidFill>
+                <a:latin typeface="Calibri" panose="020F0502020204030204" pitchFamily="34" charset="0"/>
+              </a:defRPr>
+            </a:lvl1pPr>
+            <a:lvl2pPr marL="742950" indent="-285750">
+              <a:defRPr>
+                <a:solidFill>
+                  <a:schemeClr val="tx1"/>
+                </a:solidFill>
+                <a:latin typeface="Calibri" panose="020F0502020204030204" pitchFamily="34" charset="0"/>
+              </a:defRPr>
+            </a:lvl2pPr>
+            <a:lvl3pPr marL="1143000" indent="-228600">
+              <a:defRPr>
+                <a:solidFill>
+                  <a:schemeClr val="tx1"/>
+                </a:solidFill>
+                <a:latin typeface="Calibri" panose="020F0502020204030204" pitchFamily="34" charset="0"/>
+              </a:defRPr>
+            </a:lvl3pPr>
+            <a:lvl4pPr marL="1600200" indent="-228600">
+              <a:defRPr>
+                <a:solidFill>
+                  <a:schemeClr val="tx1"/>
+                </a:solidFill>
+                <a:latin typeface="Calibri" panose="020F0502020204030204" pitchFamily="34" charset="0"/>
+              </a:defRPr>
+            </a:lvl4pPr>
+            <a:lvl5pPr marL="2057400" indent="-228600">
+              <a:defRPr>
+                <a:solidFill>
+                  <a:schemeClr val="tx1"/>
+                </a:solidFill>
+                <a:latin typeface="Calibri" panose="020F0502020204030204" pitchFamily="34" charset="0"/>
+              </a:defRPr>
+            </a:lvl5pPr>
+            <a:lvl6pPr marL="2514600" indent="-228600" eaLnBrk="0" fontAlgn="base" hangingPunct="0">
+              <a:spcBef>
+                <a:spcPct val="0"/>
+              </a:spcBef>
+              <a:spcAft>
+                <a:spcPct val="0"/>
+              </a:spcAft>
+              <a:defRPr>
+                <a:solidFill>
+                  <a:schemeClr val="tx1"/>
+                </a:solidFill>
+                <a:latin typeface="Calibri" panose="020F0502020204030204" pitchFamily="34" charset="0"/>
+              </a:defRPr>
+            </a:lvl6pPr>
+            <a:lvl7pPr marL="2971800" indent="-228600" eaLnBrk="0" fontAlgn="base" hangingPunct="0">
+              <a:spcBef>
+                <a:spcPct val="0"/>
+              </a:spcBef>
+              <a:spcAft>
+                <a:spcPct val="0"/>
+              </a:spcAft>
+              <a:defRPr>
+                <a:solidFill>
+                  <a:schemeClr val="tx1"/>
+                </a:solidFill>
+                <a:latin typeface="Calibri" panose="020F0502020204030204" pitchFamily="34" charset="0"/>
+              </a:defRPr>
+            </a:lvl7pPr>
+            <a:lvl8pPr marL="3429000" indent="-228600" eaLnBrk="0" fontAlgn="base" hangingPunct="0">
+              <a:spcBef>
+                <a:spcPct val="0"/>
+              </a:spcBef>
+              <a:spcAft>
+                <a:spcPct val="0"/>
+              </a:spcAft>
+              <a:defRPr>
+                <a:solidFill>
+                  <a:schemeClr val="tx1"/>
+                </a:solidFill>
+                <a:latin typeface="Calibri" panose="020F0502020204030204" pitchFamily="34" charset="0"/>
+              </a:defRPr>
+            </a:lvl8pPr>
+            <a:lvl9pPr marL="3886200" indent="-228600" eaLnBrk="0" fontAlgn="base" hangingPunct="0">
+              <a:spcBef>
+                <a:spcPct val="0"/>
+              </a:spcBef>
+              <a:spcAft>
+                <a:spcPct val="0"/>
+              </a:spcAft>
+              <a:defRPr>
+                <a:solidFill>
+                  <a:schemeClr val="tx1"/>
+                </a:solidFill>
+                <a:latin typeface="Calibri" panose="020F0502020204030204" pitchFamily="34" charset="0"/>
+              </a:defRPr>
+            </a:lvl9pPr>
+          </a:lstStyle>
+          <a:p>
+            <a:pPr algn="ctr" eaLnBrk="1" hangingPunct="1"/>
+            <a:r>
+              <a:rPr lang="en-US" altLang="en-US" sz="1100" dirty="0">
+                <a:latin typeface="Arial" panose="020B0604020202020204" pitchFamily="34" charset="0"/>
+                <a:ea typeface="Amazon Ember" panose="020B0603020204020204" pitchFamily="34" charset="0"/>
+                <a:cs typeface="Arial" panose="020B0604020202020204" pitchFamily="34" charset="0"/>
+              </a:rPr>
+              <a:t>S3 bucket</a:t>
+            </a:r>
+          </a:p>
+        </p:txBody>
+      </p:sp>
+      <p:pic>
+        <p:nvPicPr>
+          <p:cNvPr id="38" name="Graphic 31">
+            <a:extLst>
+              <a:ext uri="{FF2B5EF4-FFF2-40B4-BE49-F238E27FC236}">
+                <a16:creationId xmlns:a16="http://schemas.microsoft.com/office/drawing/2014/main" id="{CC3FEDEC-C656-49D7-A072-96ECD5656E94}"/>
+              </a:ext>
+            </a:extLst>
+          </p:cNvPr>
+          <p:cNvPicPr>
+            <a:picLocks noChangeAspect="1" noChangeArrowheads="1"/>
+          </p:cNvPicPr>
+          <p:nvPr/>
+        </p:nvPicPr>
+        <p:blipFill>
+          <a:blip r:embed="rId6">
+            <a:extLst>
+              <a:ext uri="{28A0092B-C50C-407E-A947-70E740481C1C}">
+                <a14:useLocalDpi xmlns:a14="http://schemas.microsoft.com/office/drawing/2010/main" val="0"/>
+              </a:ext>
+            </a:extLst>
+          </a:blip>
+          <a:srcRect/>
+          <a:stretch>
+            <a:fillRect/>
+          </a:stretch>
+        </p:blipFill>
+        <p:spPr bwMode="auto">
+          <a:xfrm>
+            <a:off x="7285967" y="5559665"/>
+            <a:ext cx="458210" cy="457200"/>
+          </a:xfrm>
+          <a:prstGeom prst="rect">
+            <a:avLst/>
+          </a:prstGeom>
+          <a:noFill/>
+          <a:ln>
+            <a:noFill/>
+          </a:ln>
+          <a:extLst>
+            <a:ext uri="{909E8E84-426E-40DD-AFC4-6F175D3DCCD1}">
+              <a14:hiddenFill xmlns:a14="http://schemas.microsoft.com/office/drawing/2010/main">
+                <a:solidFill>
+                  <a:srgbClr val="FFFFFF"/>
+                </a:solidFill>
+              </a14:hiddenFill>
+            </a:ext>
+            <a:ext uri="{91240B29-F687-4F45-9708-019B960494DF}">
+              <a14:hiddenLine xmlns:a14="http://schemas.microsoft.com/office/drawing/2010/main" w="9525">
+                <a:solidFill>
+                  <a:srgbClr val="000000"/>
+                </a:solidFill>
+                <a:miter lim="800000"/>
+                <a:headEnd/>
+                <a:tailEnd/>
+              </a14:hiddenLine>
+            </a:ext>
+          </a:extLst>
+        </p:spPr>
+      </p:pic>
+      <p:pic>
+        <p:nvPicPr>
+          <p:cNvPr id="39" name="Graphic 17">
+            <a:extLst>
+              <a:ext uri="{FF2B5EF4-FFF2-40B4-BE49-F238E27FC236}">
+                <a16:creationId xmlns:a16="http://schemas.microsoft.com/office/drawing/2014/main" id="{7719026F-7BDC-431A-B0A9-E0B888DDB7E6}"/>
+              </a:ext>
+            </a:extLst>
+          </p:cNvPr>
+          <p:cNvPicPr>
+            <a:picLocks noChangeAspect="1" noChangeArrowheads="1"/>
+          </p:cNvPicPr>
+          <p:nvPr/>
+        </p:nvPicPr>
+        <p:blipFill>
+          <a:blip r:embed="rId7">
+            <a:extLst>
+              <a:ext uri="{28A0092B-C50C-407E-A947-70E740481C1C}">
+                <a14:useLocalDpi xmlns:a14="http://schemas.microsoft.com/office/drawing/2010/main" val="0"/>
+              </a:ext>
+            </a:extLst>
+          </a:blip>
+          <a:srcRect/>
+          <a:stretch>
+            <a:fillRect/>
+          </a:stretch>
+        </p:blipFill>
+        <p:spPr bwMode="auto">
+          <a:xfrm>
+            <a:off x="7134072" y="2819145"/>
+            <a:ext cx="762000" cy="762000"/>
+          </a:xfrm>
+          <a:prstGeom prst="rect">
+            <a:avLst/>
+          </a:prstGeom>
+          <a:noFill/>
+          <a:ln>
+            <a:noFill/>
+          </a:ln>
+          <a:extLst>
+            <a:ext uri="{909E8E84-426E-40DD-AFC4-6F175D3DCCD1}">
+              <a14:hiddenFill xmlns:a14="http://schemas.microsoft.com/office/drawing/2010/main">
+                <a:solidFill>
+                  <a:srgbClr val="FFFFFF"/>
+                </a:solidFill>
+              </a14:hiddenFill>
+            </a:ext>
+            <a:ext uri="{91240B29-F687-4F45-9708-019B960494DF}">
+              <a14:hiddenLine xmlns:a14="http://schemas.microsoft.com/office/drawing/2010/main" w="9525">
+                <a:solidFill>
+                  <a:srgbClr val="000000"/>
+                </a:solidFill>
+                <a:miter lim="800000"/>
+                <a:headEnd/>
+                <a:tailEnd/>
+              </a14:hiddenLine>
+            </a:ext>
+          </a:extLst>
+        </p:spPr>
+      </p:pic>
+      <p:sp>
+        <p:nvSpPr>
+          <p:cNvPr id="40" name="TextBox 11">
+            <a:extLst>
+              <a:ext uri="{FF2B5EF4-FFF2-40B4-BE49-F238E27FC236}">
+                <a16:creationId xmlns:a16="http://schemas.microsoft.com/office/drawing/2014/main" id="{908A8E63-E399-47FC-8199-CFEC3B156DF8}"/>
+              </a:ext>
+            </a:extLst>
+          </p:cNvPr>
+          <p:cNvSpPr txBox="1">
+            <a:spLocks noChangeArrowheads="1"/>
+          </p:cNvSpPr>
+          <p:nvPr/>
+        </p:nvSpPr>
+        <p:spPr bwMode="auto">
+          <a:xfrm>
+            <a:off x="6632422" y="3583752"/>
+            <a:ext cx="1765300" cy="276999"/>
+          </a:xfrm>
+          <a:prstGeom prst="rect">
+            <a:avLst/>
+          </a:prstGeom>
+          <a:noFill/>
+          <a:ln>
+            <a:noFill/>
+          </a:ln>
+          <a:extLst>
+            <a:ext uri="{909E8E84-426E-40DD-AFC4-6F175D3DCCD1}">
+              <a14:hiddenFill xmlns:a14="http://schemas.microsoft.com/office/drawing/2010/main">
+                <a:solidFill>
+                  <a:srgbClr val="FFFFFF"/>
+                </a:solidFill>
+              </a14:hiddenFill>
+            </a:ext>
+            <a:ext uri="{91240B29-F687-4F45-9708-019B960494DF}">
+              <a14:hiddenLine xmlns:a14="http://schemas.microsoft.com/office/drawing/2010/main" w="9525">
+                <a:solidFill>
+                  <a:srgbClr val="000000"/>
+                </a:solidFill>
+                <a:miter lim="800000"/>
+                <a:headEnd/>
+                <a:tailEnd/>
+              </a14:hiddenLine>
+            </a:ext>
+          </a:extLst>
+        </p:spPr>
+        <p:txBody>
+          <a:bodyPr wrap="square">
+            <a:spAutoFit/>
+          </a:bodyPr>
+          <a:lstStyle>
+            <a:lvl1pPr>
+              <a:defRPr>
+                <a:solidFill>
+                  <a:schemeClr val="tx1"/>
+                </a:solidFill>
+                <a:latin typeface="Calibri" panose="020F0502020204030204" pitchFamily="34" charset="0"/>
+              </a:defRPr>
+            </a:lvl1pPr>
+            <a:lvl2pPr marL="742950" indent="-285750">
+              <a:defRPr>
+                <a:solidFill>
+                  <a:schemeClr val="tx1"/>
+                </a:solidFill>
+                <a:latin typeface="Calibri" panose="020F0502020204030204" pitchFamily="34" charset="0"/>
+              </a:defRPr>
+            </a:lvl2pPr>
+            <a:lvl3pPr marL="1143000" indent="-228600">
+              <a:defRPr>
+                <a:solidFill>
+                  <a:schemeClr val="tx1"/>
+                </a:solidFill>
+                <a:latin typeface="Calibri" panose="020F0502020204030204" pitchFamily="34" charset="0"/>
+              </a:defRPr>
+            </a:lvl3pPr>
+            <a:lvl4pPr marL="1600200" indent="-228600">
+              <a:defRPr>
+                <a:solidFill>
+                  <a:schemeClr val="tx1"/>
+                </a:solidFill>
+                <a:latin typeface="Calibri" panose="020F0502020204030204" pitchFamily="34" charset="0"/>
+              </a:defRPr>
+            </a:lvl4pPr>
+            <a:lvl5pPr marL="2057400" indent="-228600">
+              <a:defRPr>
+                <a:solidFill>
+                  <a:schemeClr val="tx1"/>
+                </a:solidFill>
+                <a:latin typeface="Calibri" panose="020F0502020204030204" pitchFamily="34" charset="0"/>
+              </a:defRPr>
+            </a:lvl5pPr>
+            <a:lvl6pPr marL="2514600" indent="-228600" eaLnBrk="0" fontAlgn="base" hangingPunct="0">
+              <a:spcBef>
+                <a:spcPct val="0"/>
+              </a:spcBef>
+              <a:spcAft>
+                <a:spcPct val="0"/>
+              </a:spcAft>
+              <a:defRPr>
+                <a:solidFill>
+                  <a:schemeClr val="tx1"/>
+                </a:solidFill>
+                <a:latin typeface="Calibri" panose="020F0502020204030204" pitchFamily="34" charset="0"/>
+              </a:defRPr>
+            </a:lvl6pPr>
+            <a:lvl7pPr marL="2971800" indent="-228600" eaLnBrk="0" fontAlgn="base" hangingPunct="0">
+              <a:spcBef>
+                <a:spcPct val="0"/>
+              </a:spcBef>
+              <a:spcAft>
+                <a:spcPct val="0"/>
+              </a:spcAft>
+              <a:defRPr>
+                <a:solidFill>
+                  <a:schemeClr val="tx1"/>
+                </a:solidFill>
+                <a:latin typeface="Calibri" panose="020F0502020204030204" pitchFamily="34" charset="0"/>
+              </a:defRPr>
+            </a:lvl7pPr>
+            <a:lvl8pPr marL="3429000" indent="-228600" eaLnBrk="0" fontAlgn="base" hangingPunct="0">
+              <a:spcBef>
+                <a:spcPct val="0"/>
+              </a:spcBef>
+              <a:spcAft>
+                <a:spcPct val="0"/>
+              </a:spcAft>
+              <a:defRPr>
+                <a:solidFill>
+                  <a:schemeClr val="tx1"/>
+                </a:solidFill>
+                <a:latin typeface="Calibri" panose="020F0502020204030204" pitchFamily="34" charset="0"/>
+              </a:defRPr>
+            </a:lvl8pPr>
+            <a:lvl9pPr marL="3886200" indent="-228600" eaLnBrk="0" fontAlgn="base" hangingPunct="0">
+              <a:spcBef>
+                <a:spcPct val="0"/>
+              </a:spcBef>
+              <a:spcAft>
+                <a:spcPct val="0"/>
+              </a:spcAft>
+              <a:defRPr>
+                <a:solidFill>
+                  <a:schemeClr val="tx1"/>
+                </a:solidFill>
+                <a:latin typeface="Calibri" panose="020F0502020204030204" pitchFamily="34" charset="0"/>
+              </a:defRPr>
+            </a:lvl9pPr>
+          </a:lstStyle>
+          <a:p>
+            <a:pPr algn="ctr" eaLnBrk="1" hangingPunct="1"/>
+            <a:r>
+              <a:rPr lang="en-US" altLang="en-US" sz="1200" dirty="0">
+                <a:latin typeface="Arial" panose="020B0604020202020204" pitchFamily="34" charset="0"/>
+                <a:ea typeface="Amazon Ember" panose="020B0603020204020204" pitchFamily="34" charset="0"/>
+                <a:cs typeface="Arial" panose="020B0604020202020204" pitchFamily="34" charset="0"/>
+              </a:rPr>
+              <a:t>AWS Secrets Manager</a:t>
+            </a:r>
+          </a:p>
+        </p:txBody>
+      </p:sp>
+      <p:pic>
+        <p:nvPicPr>
+          <p:cNvPr id="53" name="Graphic 23">
+            <a:extLst>
+              <a:ext uri="{FF2B5EF4-FFF2-40B4-BE49-F238E27FC236}">
+                <a16:creationId xmlns:a16="http://schemas.microsoft.com/office/drawing/2014/main" id="{69FE92FC-461B-4894-AE5B-2EAA26388CDB}"/>
+              </a:ext>
+            </a:extLst>
+          </p:cNvPr>
+          <p:cNvPicPr>
+            <a:picLocks noChangeAspect="1" noChangeArrowheads="1"/>
+          </p:cNvPicPr>
+          <p:nvPr/>
+        </p:nvPicPr>
+        <p:blipFill>
+          <a:blip r:embed="rId8">
+            <a:extLst>
+              <a:ext uri="{96DAC541-7B7A-43D3-8B79-37D633B846F1}">
+                <asvg:svgBlip xmlns:asvg="http://schemas.microsoft.com/office/drawing/2016/SVG/main" r:embed="rId9"/>
+              </a:ext>
+            </a:extLst>
+          </a:blip>
+          <a:srcRect/>
+          <a:stretch/>
+        </p:blipFill>
+        <p:spPr bwMode="auto">
+          <a:xfrm flipH="1">
+            <a:off x="1171082" y="4155673"/>
+            <a:ext cx="469900" cy="469900"/>
+          </a:xfrm>
+          <a:prstGeom prst="rect">
+            <a:avLst/>
+          </a:prstGeom>
+          <a:noFill/>
+          <a:ln>
+            <a:noFill/>
+          </a:ln>
+          <a:extLst>
+            <a:ext uri="{909E8E84-426E-40DD-AFC4-6F175D3DCCD1}">
+              <a14:hiddenFill xmlns:a14="http://schemas.microsoft.com/office/drawing/2010/main">
+                <a:solidFill>
+                  <a:srgbClr val="FFFFFF"/>
+                </a:solidFill>
+              </a14:hiddenFill>
+            </a:ext>
+            <a:ext uri="{91240B29-F687-4F45-9708-019B960494DF}">
+              <a14:hiddenLine xmlns:a14="http://schemas.microsoft.com/office/drawing/2010/main" w="9525">
+                <a:solidFill>
+                  <a:srgbClr val="000000"/>
+                </a:solidFill>
+                <a:miter lim="800000"/>
+                <a:headEnd/>
+                <a:tailEnd/>
+              </a14:hiddenLine>
+            </a:ext>
+          </a:extLst>
+        </p:spPr>
+      </p:pic>
+      <p:sp>
+        <p:nvSpPr>
+          <p:cNvPr id="54" name="TextBox 40">
+            <a:extLst>
+              <a:ext uri="{FF2B5EF4-FFF2-40B4-BE49-F238E27FC236}">
+                <a16:creationId xmlns:a16="http://schemas.microsoft.com/office/drawing/2014/main" id="{51186796-55F2-4E2E-A83E-0EC65839C3CF}"/>
+              </a:ext>
+            </a:extLst>
+          </p:cNvPr>
+          <p:cNvSpPr txBox="1">
+            <a:spLocks noChangeArrowheads="1"/>
+          </p:cNvSpPr>
+          <p:nvPr/>
+        </p:nvSpPr>
+        <p:spPr bwMode="auto">
+          <a:xfrm>
+            <a:off x="875160" y="4668189"/>
+            <a:ext cx="1073150" cy="261610"/>
+          </a:xfrm>
+          <a:prstGeom prst="rect">
+            <a:avLst/>
+          </a:prstGeom>
+          <a:noFill/>
+          <a:ln>
+            <a:noFill/>
+          </a:ln>
+          <a:extLst>
+            <a:ext uri="{909E8E84-426E-40DD-AFC4-6F175D3DCCD1}">
+              <a14:hiddenFill xmlns:a14="http://schemas.microsoft.com/office/drawing/2010/main">
+                <a:solidFill>
+                  <a:srgbClr val="FFFFFF"/>
+                </a:solidFill>
+              </a14:hiddenFill>
+            </a:ext>
+            <a:ext uri="{91240B29-F687-4F45-9708-019B960494DF}">
+              <a14:hiddenLine xmlns:a14="http://schemas.microsoft.com/office/drawing/2010/main" w="9525">
+                <a:solidFill>
+                  <a:srgbClr val="000000"/>
+                </a:solidFill>
+                <a:miter lim="800000"/>
+                <a:headEnd/>
+                <a:tailEnd/>
+              </a14:hiddenLine>
+            </a:ext>
+          </a:extLst>
+        </p:spPr>
+        <p:txBody>
+          <a:bodyPr>
+            <a:spAutoFit/>
+          </a:bodyPr>
+          <a:lstStyle>
+            <a:lvl1pPr>
+              <a:defRPr>
+                <a:solidFill>
+                  <a:schemeClr val="tx1"/>
+                </a:solidFill>
+                <a:latin typeface="Calibri" panose="020F0502020204030204" pitchFamily="34" charset="0"/>
+              </a:defRPr>
+            </a:lvl1pPr>
+            <a:lvl2pPr marL="742950" indent="-285750">
+              <a:defRPr>
+                <a:solidFill>
+                  <a:schemeClr val="tx1"/>
+                </a:solidFill>
+                <a:latin typeface="Calibri" panose="020F0502020204030204" pitchFamily="34" charset="0"/>
+              </a:defRPr>
+            </a:lvl2pPr>
+            <a:lvl3pPr marL="1143000" indent="-228600">
+              <a:defRPr>
+                <a:solidFill>
+                  <a:schemeClr val="tx1"/>
+                </a:solidFill>
+                <a:latin typeface="Calibri" panose="020F0502020204030204" pitchFamily="34" charset="0"/>
+              </a:defRPr>
+            </a:lvl3pPr>
+            <a:lvl4pPr marL="1600200" indent="-228600">
+              <a:defRPr>
+                <a:solidFill>
+                  <a:schemeClr val="tx1"/>
+                </a:solidFill>
+                <a:latin typeface="Calibri" panose="020F0502020204030204" pitchFamily="34" charset="0"/>
+              </a:defRPr>
+            </a:lvl4pPr>
+            <a:lvl5pPr marL="2057400" indent="-228600">
+              <a:defRPr>
+                <a:solidFill>
+                  <a:schemeClr val="tx1"/>
+                </a:solidFill>
+                <a:latin typeface="Calibri" panose="020F0502020204030204" pitchFamily="34" charset="0"/>
+              </a:defRPr>
+            </a:lvl5pPr>
+            <a:lvl6pPr marL="2514600" indent="-228600" eaLnBrk="0" fontAlgn="base" hangingPunct="0">
+              <a:spcBef>
+                <a:spcPct val="0"/>
+              </a:spcBef>
+              <a:spcAft>
+                <a:spcPct val="0"/>
+              </a:spcAft>
+              <a:defRPr>
+                <a:solidFill>
+                  <a:schemeClr val="tx1"/>
+                </a:solidFill>
+                <a:latin typeface="Calibri" panose="020F0502020204030204" pitchFamily="34" charset="0"/>
+              </a:defRPr>
+            </a:lvl6pPr>
+            <a:lvl7pPr marL="2971800" indent="-228600" eaLnBrk="0" fontAlgn="base" hangingPunct="0">
+              <a:spcBef>
+                <a:spcPct val="0"/>
+              </a:spcBef>
+              <a:spcAft>
+                <a:spcPct val="0"/>
+              </a:spcAft>
+              <a:defRPr>
+                <a:solidFill>
+                  <a:schemeClr val="tx1"/>
+                </a:solidFill>
+                <a:latin typeface="Calibri" panose="020F0502020204030204" pitchFamily="34" charset="0"/>
+              </a:defRPr>
+            </a:lvl7pPr>
+            <a:lvl8pPr marL="3429000" indent="-228600" eaLnBrk="0" fontAlgn="base" hangingPunct="0">
+              <a:spcBef>
+                <a:spcPct val="0"/>
+              </a:spcBef>
+              <a:spcAft>
+                <a:spcPct val="0"/>
+              </a:spcAft>
+              <a:defRPr>
+                <a:solidFill>
+                  <a:schemeClr val="tx1"/>
+                </a:solidFill>
+                <a:latin typeface="Calibri" panose="020F0502020204030204" pitchFamily="34" charset="0"/>
+              </a:defRPr>
+            </a:lvl8pPr>
+            <a:lvl9pPr marL="3886200" indent="-228600" eaLnBrk="0" fontAlgn="base" hangingPunct="0">
+              <a:spcBef>
+                <a:spcPct val="0"/>
+              </a:spcBef>
+              <a:spcAft>
+                <a:spcPct val="0"/>
+              </a:spcAft>
+              <a:defRPr>
+                <a:solidFill>
+                  <a:schemeClr val="tx1"/>
+                </a:solidFill>
+                <a:latin typeface="Calibri" panose="020F0502020204030204" pitchFamily="34" charset="0"/>
+              </a:defRPr>
+            </a:lvl9pPr>
+          </a:lstStyle>
+          <a:p>
+            <a:pPr algn="ctr" eaLnBrk="1" hangingPunct="1"/>
+            <a:r>
+              <a:rPr lang="en-US" altLang="en-US" sz="1100" dirty="0">
+                <a:solidFill>
+                  <a:srgbClr val="000000"/>
+                </a:solidFill>
+                <a:latin typeface="Arial" panose="020B0604020202020204" pitchFamily="34" charset="0"/>
+                <a:cs typeface="Arial" panose="020B0604020202020204" pitchFamily="34" charset="0"/>
+              </a:rPr>
+              <a:t>Git users</a:t>
+            </a:r>
+          </a:p>
+        </p:txBody>
+      </p:sp>
+      <p:cxnSp>
+        <p:nvCxnSpPr>
+          <p:cNvPr id="74" name="Straight Arrow Connector 73">
+            <a:extLst>
+              <a:ext uri="{FF2B5EF4-FFF2-40B4-BE49-F238E27FC236}">
+                <a16:creationId xmlns:a16="http://schemas.microsoft.com/office/drawing/2014/main" id="{36596965-9D53-40C3-8F04-36632511B75B}"/>
+              </a:ext>
+            </a:extLst>
+          </p:cNvPr>
+          <p:cNvCxnSpPr>
+            <a:cxnSpLocks/>
+            <a:stCxn id="53" idx="1"/>
+            <a:endCxn id="42" idx="1"/>
+          </p:cNvCxnSpPr>
+          <p:nvPr/>
+        </p:nvCxnSpPr>
+        <p:spPr>
+          <a:xfrm>
+            <a:off x="1640982" y="4390623"/>
+            <a:ext cx="948848" cy="0"/>
+          </a:xfrm>
+          <a:prstGeom prst="straightConnector1">
+            <a:avLst/>
+          </a:prstGeom>
+          <a:ln w="12700">
+            <a:solidFill>
+              <a:srgbClr val="545B64"/>
+            </a:solidFill>
+            <a:headEnd type="none" w="med" len="sm"/>
+            <a:tailEnd type="arrow" w="med" len="sm"/>
+          </a:ln>
+        </p:spPr>
+        <p:style>
+          <a:lnRef idx="1">
+            <a:schemeClr val="accent1"/>
+          </a:lnRef>
+          <a:fillRef idx="0">
+            <a:schemeClr val="accent1"/>
+          </a:fillRef>
+          <a:effectRef idx="0">
+            <a:schemeClr val="accent1"/>
+          </a:effectRef>
+          <a:fontRef idx="minor">
+            <a:schemeClr val="tx1"/>
+          </a:fontRef>
+        </p:style>
+      </p:cxnSp>
+      <p:sp>
+        <p:nvSpPr>
+          <p:cNvPr id="77" name="TextBox 40">
+            <a:extLst>
+              <a:ext uri="{FF2B5EF4-FFF2-40B4-BE49-F238E27FC236}">
+                <a16:creationId xmlns:a16="http://schemas.microsoft.com/office/drawing/2014/main" id="{47F6537C-93F5-4EEF-B694-AC114A5E550B}"/>
+              </a:ext>
+            </a:extLst>
+          </p:cNvPr>
+          <p:cNvSpPr txBox="1">
+            <a:spLocks noChangeArrowheads="1"/>
+          </p:cNvSpPr>
+          <p:nvPr/>
+        </p:nvSpPr>
+        <p:spPr bwMode="auto">
+          <a:xfrm>
+            <a:off x="1505952" y="4131432"/>
+            <a:ext cx="1073150" cy="261610"/>
+          </a:xfrm>
+          <a:prstGeom prst="rect">
+            <a:avLst/>
+          </a:prstGeom>
+          <a:noFill/>
+          <a:ln>
+            <a:noFill/>
+          </a:ln>
+          <a:extLst>
+            <a:ext uri="{909E8E84-426E-40DD-AFC4-6F175D3DCCD1}">
+              <a14:hiddenFill xmlns:a14="http://schemas.microsoft.com/office/drawing/2010/main">
+                <a:solidFill>
+                  <a:srgbClr val="FFFFFF"/>
+                </a:solidFill>
+              </a14:hiddenFill>
+            </a:ext>
+            <a:ext uri="{91240B29-F687-4F45-9708-019B960494DF}">
+              <a14:hiddenLine xmlns:a14="http://schemas.microsoft.com/office/drawing/2010/main" w="9525">
+                <a:solidFill>
+                  <a:srgbClr val="000000"/>
+                </a:solidFill>
+                <a:miter lim="800000"/>
+                <a:headEnd/>
+                <a:tailEnd/>
+              </a14:hiddenLine>
+            </a:ext>
+          </a:extLst>
+        </p:spPr>
+        <p:txBody>
+          <a:bodyPr>
+            <a:spAutoFit/>
+          </a:bodyPr>
+          <a:lstStyle>
+            <a:lvl1pPr>
+              <a:defRPr>
+                <a:solidFill>
+                  <a:schemeClr val="tx1"/>
+                </a:solidFill>
+                <a:latin typeface="Calibri" panose="020F0502020204030204" pitchFamily="34" charset="0"/>
+              </a:defRPr>
+            </a:lvl1pPr>
+            <a:lvl2pPr marL="742950" indent="-285750">
+              <a:defRPr>
+                <a:solidFill>
+                  <a:schemeClr val="tx1"/>
+                </a:solidFill>
+                <a:latin typeface="Calibri" panose="020F0502020204030204" pitchFamily="34" charset="0"/>
+              </a:defRPr>
+            </a:lvl2pPr>
+            <a:lvl3pPr marL="1143000" indent="-228600">
+              <a:defRPr>
+                <a:solidFill>
+                  <a:schemeClr val="tx1"/>
+                </a:solidFill>
+                <a:latin typeface="Calibri" panose="020F0502020204030204" pitchFamily="34" charset="0"/>
+              </a:defRPr>
+            </a:lvl3pPr>
+            <a:lvl4pPr marL="1600200" indent="-228600">
+              <a:defRPr>
+                <a:solidFill>
+                  <a:schemeClr val="tx1"/>
+                </a:solidFill>
+                <a:latin typeface="Calibri" panose="020F0502020204030204" pitchFamily="34" charset="0"/>
+              </a:defRPr>
+            </a:lvl4pPr>
+            <a:lvl5pPr marL="2057400" indent="-228600">
+              <a:defRPr>
+                <a:solidFill>
+                  <a:schemeClr val="tx1"/>
+                </a:solidFill>
+                <a:latin typeface="Calibri" panose="020F0502020204030204" pitchFamily="34" charset="0"/>
+              </a:defRPr>
+            </a:lvl5pPr>
+            <a:lvl6pPr marL="2514600" indent="-228600" eaLnBrk="0" fontAlgn="base" hangingPunct="0">
+              <a:spcBef>
+                <a:spcPct val="0"/>
+              </a:spcBef>
+              <a:spcAft>
+                <a:spcPct val="0"/>
+              </a:spcAft>
+              <a:defRPr>
+                <a:solidFill>
+                  <a:schemeClr val="tx1"/>
+                </a:solidFill>
+                <a:latin typeface="Calibri" panose="020F0502020204030204" pitchFamily="34" charset="0"/>
+              </a:defRPr>
+            </a:lvl6pPr>
+            <a:lvl7pPr marL="2971800" indent="-228600" eaLnBrk="0" fontAlgn="base" hangingPunct="0">
+              <a:spcBef>
+                <a:spcPct val="0"/>
+              </a:spcBef>
+              <a:spcAft>
+                <a:spcPct val="0"/>
+              </a:spcAft>
+              <a:defRPr>
+                <a:solidFill>
+                  <a:schemeClr val="tx1"/>
+                </a:solidFill>
+                <a:latin typeface="Calibri" panose="020F0502020204030204" pitchFamily="34" charset="0"/>
+              </a:defRPr>
+            </a:lvl7pPr>
+            <a:lvl8pPr marL="3429000" indent="-228600" eaLnBrk="0" fontAlgn="base" hangingPunct="0">
+              <a:spcBef>
+                <a:spcPct val="0"/>
+              </a:spcBef>
+              <a:spcAft>
+                <a:spcPct val="0"/>
+              </a:spcAft>
+              <a:defRPr>
+                <a:solidFill>
+                  <a:schemeClr val="tx1"/>
+                </a:solidFill>
+                <a:latin typeface="Calibri" panose="020F0502020204030204" pitchFamily="34" charset="0"/>
+              </a:defRPr>
+            </a:lvl8pPr>
+            <a:lvl9pPr marL="3886200" indent="-228600" eaLnBrk="0" fontAlgn="base" hangingPunct="0">
+              <a:spcBef>
+                <a:spcPct val="0"/>
+              </a:spcBef>
+              <a:spcAft>
+                <a:spcPct val="0"/>
+              </a:spcAft>
+              <a:defRPr>
+                <a:solidFill>
+                  <a:schemeClr val="tx1"/>
+                </a:solidFill>
+                <a:latin typeface="Calibri" panose="020F0502020204030204" pitchFamily="34" charset="0"/>
+              </a:defRPr>
+            </a:lvl9pPr>
+          </a:lstStyle>
+          <a:p>
+            <a:pPr algn="ctr" eaLnBrk="1" hangingPunct="1"/>
+            <a:r>
+              <a:rPr lang="en-US" altLang="en-US" sz="1100" i="1" dirty="0">
+                <a:solidFill>
+                  <a:srgbClr val="000000"/>
+                </a:solidFill>
+                <a:latin typeface="Arial" panose="020B0604020202020204" pitchFamily="34" charset="0"/>
+                <a:cs typeface="Arial" panose="020B0604020202020204" pitchFamily="34" charset="0"/>
+              </a:rPr>
+              <a:t>Git push</a:t>
+            </a:r>
+          </a:p>
+        </p:txBody>
+      </p:sp>
+      <p:sp>
+        <p:nvSpPr>
+          <p:cNvPr id="78" name="TextBox 40">
+            <a:extLst>
+              <a:ext uri="{FF2B5EF4-FFF2-40B4-BE49-F238E27FC236}">
+                <a16:creationId xmlns:a16="http://schemas.microsoft.com/office/drawing/2014/main" id="{D8DFE7E6-0BA7-424F-9333-C3BADE3D6EDC}"/>
+              </a:ext>
+            </a:extLst>
+          </p:cNvPr>
+          <p:cNvSpPr txBox="1">
+            <a:spLocks noChangeArrowheads="1"/>
+          </p:cNvSpPr>
+          <p:nvPr/>
+        </p:nvSpPr>
+        <p:spPr bwMode="auto">
+          <a:xfrm>
+            <a:off x="3023610" y="4133864"/>
+            <a:ext cx="1073150" cy="261610"/>
+          </a:xfrm>
+          <a:prstGeom prst="rect">
+            <a:avLst/>
+          </a:prstGeom>
+          <a:noFill/>
+          <a:ln>
+            <a:noFill/>
+          </a:ln>
+          <a:extLst>
+            <a:ext uri="{909E8E84-426E-40DD-AFC4-6F175D3DCCD1}">
+              <a14:hiddenFill xmlns:a14="http://schemas.microsoft.com/office/drawing/2010/main">
+                <a:solidFill>
+                  <a:srgbClr val="FFFFFF"/>
+                </a:solidFill>
+              </a14:hiddenFill>
+            </a:ext>
+            <a:ext uri="{91240B29-F687-4F45-9708-019B960494DF}">
+              <a14:hiddenLine xmlns:a14="http://schemas.microsoft.com/office/drawing/2010/main" w="9525">
+                <a:solidFill>
+                  <a:srgbClr val="000000"/>
+                </a:solidFill>
+                <a:miter lim="800000"/>
+                <a:headEnd/>
+                <a:tailEnd/>
+              </a14:hiddenLine>
+            </a:ext>
+          </a:extLst>
+        </p:spPr>
+        <p:txBody>
+          <a:bodyPr>
+            <a:spAutoFit/>
+          </a:bodyPr>
+          <a:lstStyle>
+            <a:lvl1pPr>
+              <a:defRPr>
+                <a:solidFill>
+                  <a:schemeClr val="tx1"/>
+                </a:solidFill>
+                <a:latin typeface="Calibri" panose="020F0502020204030204" pitchFamily="34" charset="0"/>
+              </a:defRPr>
+            </a:lvl1pPr>
+            <a:lvl2pPr marL="742950" indent="-285750">
+              <a:defRPr>
+                <a:solidFill>
+                  <a:schemeClr val="tx1"/>
+                </a:solidFill>
+                <a:latin typeface="Calibri" panose="020F0502020204030204" pitchFamily="34" charset="0"/>
+              </a:defRPr>
+            </a:lvl2pPr>
+            <a:lvl3pPr marL="1143000" indent="-228600">
+              <a:defRPr>
+                <a:solidFill>
+                  <a:schemeClr val="tx1"/>
+                </a:solidFill>
+                <a:latin typeface="Calibri" panose="020F0502020204030204" pitchFamily="34" charset="0"/>
+              </a:defRPr>
+            </a:lvl3pPr>
+            <a:lvl4pPr marL="1600200" indent="-228600">
+              <a:defRPr>
+                <a:solidFill>
+                  <a:schemeClr val="tx1"/>
+                </a:solidFill>
+                <a:latin typeface="Calibri" panose="020F0502020204030204" pitchFamily="34" charset="0"/>
+              </a:defRPr>
+            </a:lvl4pPr>
+            <a:lvl5pPr marL="2057400" indent="-228600">
+              <a:defRPr>
+                <a:solidFill>
+                  <a:schemeClr val="tx1"/>
+                </a:solidFill>
+                <a:latin typeface="Calibri" panose="020F0502020204030204" pitchFamily="34" charset="0"/>
+              </a:defRPr>
+            </a:lvl5pPr>
+            <a:lvl6pPr marL="2514600" indent="-228600" eaLnBrk="0" fontAlgn="base" hangingPunct="0">
+              <a:spcBef>
+                <a:spcPct val="0"/>
+              </a:spcBef>
+              <a:spcAft>
+                <a:spcPct val="0"/>
+              </a:spcAft>
+              <a:defRPr>
+                <a:solidFill>
+                  <a:schemeClr val="tx1"/>
+                </a:solidFill>
+                <a:latin typeface="Calibri" panose="020F0502020204030204" pitchFamily="34" charset="0"/>
+              </a:defRPr>
+            </a:lvl6pPr>
+            <a:lvl7pPr marL="2971800" indent="-228600" eaLnBrk="0" fontAlgn="base" hangingPunct="0">
+              <a:spcBef>
+                <a:spcPct val="0"/>
+              </a:spcBef>
+              <a:spcAft>
+                <a:spcPct val="0"/>
+              </a:spcAft>
+              <a:defRPr>
+                <a:solidFill>
+                  <a:schemeClr val="tx1"/>
+                </a:solidFill>
+                <a:latin typeface="Calibri" panose="020F0502020204030204" pitchFamily="34" charset="0"/>
+              </a:defRPr>
+            </a:lvl7pPr>
+            <a:lvl8pPr marL="3429000" indent="-228600" eaLnBrk="0" fontAlgn="base" hangingPunct="0">
+              <a:spcBef>
+                <a:spcPct val="0"/>
+              </a:spcBef>
+              <a:spcAft>
+                <a:spcPct val="0"/>
+              </a:spcAft>
+              <a:defRPr>
+                <a:solidFill>
+                  <a:schemeClr val="tx1"/>
+                </a:solidFill>
+                <a:latin typeface="Calibri" panose="020F0502020204030204" pitchFamily="34" charset="0"/>
+              </a:defRPr>
+            </a:lvl8pPr>
+            <a:lvl9pPr marL="3886200" indent="-228600" eaLnBrk="0" fontAlgn="base" hangingPunct="0">
+              <a:spcBef>
+                <a:spcPct val="0"/>
+              </a:spcBef>
+              <a:spcAft>
+                <a:spcPct val="0"/>
+              </a:spcAft>
+              <a:defRPr>
+                <a:solidFill>
+                  <a:schemeClr val="tx1"/>
+                </a:solidFill>
+                <a:latin typeface="Calibri" panose="020F0502020204030204" pitchFamily="34" charset="0"/>
+              </a:defRPr>
+            </a:lvl9pPr>
+          </a:lstStyle>
+          <a:p>
+            <a:pPr algn="ctr" eaLnBrk="1" hangingPunct="1"/>
+            <a:r>
+              <a:rPr lang="en-US" altLang="en-US" sz="1100" i="1" dirty="0">
+                <a:solidFill>
+                  <a:srgbClr val="000000"/>
+                </a:solidFill>
+                <a:latin typeface="Arial" panose="020B0604020202020204" pitchFamily="34" charset="0"/>
+                <a:cs typeface="Arial" panose="020B0604020202020204" pitchFamily="34" charset="0"/>
+              </a:rPr>
+              <a:t>Git webhook</a:t>
+            </a:r>
+          </a:p>
+        </p:txBody>
+      </p:sp>
+      <p:pic>
+        <p:nvPicPr>
+          <p:cNvPr id="95" name="Graphic 24">
+            <a:extLst>
+              <a:ext uri="{FF2B5EF4-FFF2-40B4-BE49-F238E27FC236}">
+                <a16:creationId xmlns:a16="http://schemas.microsoft.com/office/drawing/2014/main" id="{07932D61-E798-4373-A080-D9363F121C65}"/>
+              </a:ext>
+            </a:extLst>
+          </p:cNvPr>
+          <p:cNvPicPr>
+            <a:picLocks noChangeAspect="1" noChangeArrowheads="1"/>
+          </p:cNvPicPr>
+          <p:nvPr/>
+        </p:nvPicPr>
+        <p:blipFill>
+          <a:blip r:embed="rId10">
+            <a:extLst>
+              <a:ext uri="{96DAC541-7B7A-43D3-8B79-37D633B846F1}">
+                <asvg:svgBlip xmlns:asvg="http://schemas.microsoft.com/office/drawing/2016/SVG/main" r:embed="rId11"/>
+              </a:ext>
+            </a:extLst>
+          </a:blip>
+          <a:srcRect/>
+          <a:stretch/>
+        </p:blipFill>
+        <p:spPr bwMode="auto">
+          <a:xfrm>
+            <a:off x="5226074" y="4155673"/>
+            <a:ext cx="469900" cy="469900"/>
+          </a:xfrm>
+          <a:prstGeom prst="rect">
+            <a:avLst/>
+          </a:prstGeom>
+          <a:noFill/>
+          <a:ln>
+            <a:noFill/>
+          </a:ln>
+          <a:extLst>
+            <a:ext uri="{909E8E84-426E-40DD-AFC4-6F175D3DCCD1}">
+              <a14:hiddenFill xmlns:a14="http://schemas.microsoft.com/office/drawing/2010/main">
+                <a:solidFill>
+                  <a:srgbClr val="FFFFFF"/>
+                </a:solidFill>
+              </a14:hiddenFill>
+            </a:ext>
+            <a:ext uri="{91240B29-F687-4F45-9708-019B960494DF}">
+              <a14:hiddenLine xmlns:a14="http://schemas.microsoft.com/office/drawing/2010/main" w="9525">
+                <a:solidFill>
+                  <a:srgbClr val="000000"/>
+                </a:solidFill>
+                <a:miter lim="800000"/>
+                <a:headEnd/>
+                <a:tailEnd/>
+              </a14:hiddenLine>
+            </a:ext>
+          </a:extLst>
+        </p:spPr>
+      </p:pic>
+      <p:sp>
+        <p:nvSpPr>
+          <p:cNvPr id="96" name="TextBox 25">
+            <a:extLst>
+              <a:ext uri="{FF2B5EF4-FFF2-40B4-BE49-F238E27FC236}">
+                <a16:creationId xmlns:a16="http://schemas.microsoft.com/office/drawing/2014/main" id="{AA0F0DB2-BA25-460B-95DA-A7CEFDA9AB7F}"/>
+              </a:ext>
+            </a:extLst>
+          </p:cNvPr>
+          <p:cNvSpPr txBox="1">
+            <a:spLocks noChangeArrowheads="1"/>
+          </p:cNvSpPr>
+          <p:nvPr/>
+        </p:nvSpPr>
+        <p:spPr bwMode="auto">
+          <a:xfrm>
+            <a:off x="4924449" y="4668189"/>
+            <a:ext cx="1073150" cy="261610"/>
+          </a:xfrm>
+          <a:prstGeom prst="rect">
+            <a:avLst/>
+          </a:prstGeom>
+          <a:noFill/>
+          <a:ln>
+            <a:noFill/>
+          </a:ln>
+          <a:extLst>
+            <a:ext uri="{909E8E84-426E-40DD-AFC4-6F175D3DCCD1}">
+              <a14:hiddenFill xmlns:a14="http://schemas.microsoft.com/office/drawing/2010/main">
+                <a:solidFill>
+                  <a:srgbClr val="FFFFFF"/>
+                </a:solidFill>
+              </a14:hiddenFill>
+            </a:ext>
+            <a:ext uri="{91240B29-F687-4F45-9708-019B960494DF}">
+              <a14:hiddenLine xmlns:a14="http://schemas.microsoft.com/office/drawing/2010/main" w="9525">
+                <a:solidFill>
+                  <a:srgbClr val="000000"/>
+                </a:solidFill>
+                <a:miter lim="800000"/>
+                <a:headEnd/>
+                <a:tailEnd/>
+              </a14:hiddenLine>
+            </a:ext>
+          </a:extLst>
+        </p:spPr>
+        <p:txBody>
+          <a:bodyPr>
+            <a:spAutoFit/>
+          </a:bodyPr>
+          <a:lstStyle>
+            <a:lvl1pPr>
+              <a:defRPr>
+                <a:solidFill>
+                  <a:schemeClr val="tx1"/>
+                </a:solidFill>
+                <a:latin typeface="Calibri" panose="020F0502020204030204" pitchFamily="34" charset="0"/>
+              </a:defRPr>
+            </a:lvl1pPr>
+            <a:lvl2pPr marL="742950" indent="-285750">
+              <a:defRPr>
+                <a:solidFill>
+                  <a:schemeClr val="tx1"/>
+                </a:solidFill>
+                <a:latin typeface="Calibri" panose="020F0502020204030204" pitchFamily="34" charset="0"/>
+              </a:defRPr>
+            </a:lvl2pPr>
+            <a:lvl3pPr marL="1143000" indent="-228600">
+              <a:defRPr>
+                <a:solidFill>
+                  <a:schemeClr val="tx1"/>
+                </a:solidFill>
+                <a:latin typeface="Calibri" panose="020F0502020204030204" pitchFamily="34" charset="0"/>
+              </a:defRPr>
+            </a:lvl3pPr>
+            <a:lvl4pPr marL="1600200" indent="-228600">
+              <a:defRPr>
+                <a:solidFill>
+                  <a:schemeClr val="tx1"/>
+                </a:solidFill>
+                <a:latin typeface="Calibri" panose="020F0502020204030204" pitchFamily="34" charset="0"/>
+              </a:defRPr>
+            </a:lvl4pPr>
+            <a:lvl5pPr marL="2057400" indent="-228600">
+              <a:defRPr>
+                <a:solidFill>
+                  <a:schemeClr val="tx1"/>
+                </a:solidFill>
+                <a:latin typeface="Calibri" panose="020F0502020204030204" pitchFamily="34" charset="0"/>
+              </a:defRPr>
+            </a:lvl5pPr>
+            <a:lvl6pPr marL="2514600" indent="-228600" eaLnBrk="0" fontAlgn="base" hangingPunct="0">
+              <a:spcBef>
+                <a:spcPct val="0"/>
+              </a:spcBef>
+              <a:spcAft>
+                <a:spcPct val="0"/>
+              </a:spcAft>
+              <a:defRPr>
+                <a:solidFill>
+                  <a:schemeClr val="tx1"/>
+                </a:solidFill>
+                <a:latin typeface="Calibri" panose="020F0502020204030204" pitchFamily="34" charset="0"/>
+              </a:defRPr>
+            </a:lvl6pPr>
+            <a:lvl7pPr marL="2971800" indent="-228600" eaLnBrk="0" fontAlgn="base" hangingPunct="0">
+              <a:spcBef>
+                <a:spcPct val="0"/>
+              </a:spcBef>
+              <a:spcAft>
+                <a:spcPct val="0"/>
+              </a:spcAft>
+              <a:defRPr>
+                <a:solidFill>
+                  <a:schemeClr val="tx1"/>
+                </a:solidFill>
+                <a:latin typeface="Calibri" panose="020F0502020204030204" pitchFamily="34" charset="0"/>
+              </a:defRPr>
+            </a:lvl7pPr>
+            <a:lvl8pPr marL="3429000" indent="-228600" eaLnBrk="0" fontAlgn="base" hangingPunct="0">
+              <a:spcBef>
+                <a:spcPct val="0"/>
+              </a:spcBef>
+              <a:spcAft>
+                <a:spcPct val="0"/>
+              </a:spcAft>
+              <a:defRPr>
+                <a:solidFill>
+                  <a:schemeClr val="tx1"/>
+                </a:solidFill>
+                <a:latin typeface="Calibri" panose="020F0502020204030204" pitchFamily="34" charset="0"/>
+              </a:defRPr>
+            </a:lvl8pPr>
+            <a:lvl9pPr marL="3886200" indent="-228600" eaLnBrk="0" fontAlgn="base" hangingPunct="0">
+              <a:spcBef>
+                <a:spcPct val="0"/>
+              </a:spcBef>
+              <a:spcAft>
+                <a:spcPct val="0"/>
+              </a:spcAft>
+              <a:defRPr>
+                <a:solidFill>
+                  <a:schemeClr val="tx1"/>
+                </a:solidFill>
+                <a:latin typeface="Calibri" panose="020F0502020204030204" pitchFamily="34" charset="0"/>
+              </a:defRPr>
+            </a:lvl9pPr>
+          </a:lstStyle>
+          <a:p>
+            <a:pPr algn="ctr" eaLnBrk="1" hangingPunct="1"/>
+            <a:r>
+              <a:rPr lang="en-US" altLang="en-US" sz="1100" dirty="0">
+                <a:solidFill>
+                  <a:srgbClr val="000000"/>
+                </a:solidFill>
+                <a:latin typeface="Arial" panose="020B0604020202020204" pitchFamily="34" charset="0"/>
+                <a:cs typeface="Arial" panose="020B0604020202020204" pitchFamily="34" charset="0"/>
+              </a:rPr>
+              <a:t>Source code</a:t>
+            </a:r>
+          </a:p>
+        </p:txBody>
+      </p:sp>
+      <p:sp>
+        <p:nvSpPr>
+          <p:cNvPr id="97" name="TextBox 40">
+            <a:extLst>
+              <a:ext uri="{FF2B5EF4-FFF2-40B4-BE49-F238E27FC236}">
+                <a16:creationId xmlns:a16="http://schemas.microsoft.com/office/drawing/2014/main" id="{4E431A77-536E-4C99-8742-F99CC3F275FA}"/>
+              </a:ext>
+            </a:extLst>
+          </p:cNvPr>
+          <p:cNvSpPr txBox="1">
+            <a:spLocks noChangeArrowheads="1"/>
+          </p:cNvSpPr>
+          <p:nvPr/>
+        </p:nvSpPr>
+        <p:spPr bwMode="auto">
+          <a:xfrm>
+            <a:off x="6095269" y="7067984"/>
+            <a:ext cx="1073150" cy="261610"/>
+          </a:xfrm>
+          <a:prstGeom prst="rect">
+            <a:avLst/>
+          </a:prstGeom>
+          <a:noFill/>
+          <a:ln>
+            <a:noFill/>
+          </a:ln>
+          <a:extLst>
+            <a:ext uri="{909E8E84-426E-40DD-AFC4-6F175D3DCCD1}">
+              <a14:hiddenFill xmlns:a14="http://schemas.microsoft.com/office/drawing/2010/main">
+                <a:solidFill>
+                  <a:srgbClr val="FFFFFF"/>
+                </a:solidFill>
+              </a14:hiddenFill>
+            </a:ext>
+            <a:ext uri="{91240B29-F687-4F45-9708-019B960494DF}">
+              <a14:hiddenLine xmlns:a14="http://schemas.microsoft.com/office/drawing/2010/main" w="9525">
+                <a:solidFill>
+                  <a:srgbClr val="000000"/>
+                </a:solidFill>
+                <a:miter lim="800000"/>
+                <a:headEnd/>
+                <a:tailEnd/>
+              </a14:hiddenLine>
+            </a:ext>
+          </a:extLst>
+        </p:spPr>
+        <p:txBody>
+          <a:bodyPr>
+            <a:spAutoFit/>
+          </a:bodyPr>
+          <a:lstStyle>
+            <a:lvl1pPr>
+              <a:defRPr>
+                <a:solidFill>
+                  <a:schemeClr val="tx1"/>
+                </a:solidFill>
+                <a:latin typeface="Calibri" panose="020F0502020204030204" pitchFamily="34" charset="0"/>
+              </a:defRPr>
+            </a:lvl1pPr>
+            <a:lvl2pPr marL="742950" indent="-285750">
+              <a:defRPr>
+                <a:solidFill>
+                  <a:schemeClr val="tx1"/>
+                </a:solidFill>
+                <a:latin typeface="Calibri" panose="020F0502020204030204" pitchFamily="34" charset="0"/>
+              </a:defRPr>
+            </a:lvl2pPr>
+            <a:lvl3pPr marL="1143000" indent="-228600">
+              <a:defRPr>
+                <a:solidFill>
+                  <a:schemeClr val="tx1"/>
+                </a:solidFill>
+                <a:latin typeface="Calibri" panose="020F0502020204030204" pitchFamily="34" charset="0"/>
+              </a:defRPr>
+            </a:lvl3pPr>
+            <a:lvl4pPr marL="1600200" indent="-228600">
+              <a:defRPr>
+                <a:solidFill>
+                  <a:schemeClr val="tx1"/>
+                </a:solidFill>
+                <a:latin typeface="Calibri" panose="020F0502020204030204" pitchFamily="34" charset="0"/>
+              </a:defRPr>
+            </a:lvl4pPr>
+            <a:lvl5pPr marL="2057400" indent="-228600">
+              <a:defRPr>
+                <a:solidFill>
+                  <a:schemeClr val="tx1"/>
+                </a:solidFill>
+                <a:latin typeface="Calibri" panose="020F0502020204030204" pitchFamily="34" charset="0"/>
+              </a:defRPr>
+            </a:lvl5pPr>
+            <a:lvl6pPr marL="2514600" indent="-228600" eaLnBrk="0" fontAlgn="base" hangingPunct="0">
+              <a:spcBef>
+                <a:spcPct val="0"/>
+              </a:spcBef>
+              <a:spcAft>
+                <a:spcPct val="0"/>
+              </a:spcAft>
+              <a:defRPr>
+                <a:solidFill>
+                  <a:schemeClr val="tx1"/>
+                </a:solidFill>
+                <a:latin typeface="Calibri" panose="020F0502020204030204" pitchFamily="34" charset="0"/>
+              </a:defRPr>
+            </a:lvl6pPr>
+            <a:lvl7pPr marL="2971800" indent="-228600" eaLnBrk="0" fontAlgn="base" hangingPunct="0">
+              <a:spcBef>
+                <a:spcPct val="0"/>
+              </a:spcBef>
+              <a:spcAft>
+                <a:spcPct val="0"/>
+              </a:spcAft>
+              <a:defRPr>
+                <a:solidFill>
+                  <a:schemeClr val="tx1"/>
+                </a:solidFill>
+                <a:latin typeface="Calibri" panose="020F0502020204030204" pitchFamily="34" charset="0"/>
+              </a:defRPr>
+            </a:lvl7pPr>
+            <a:lvl8pPr marL="3429000" indent="-228600" eaLnBrk="0" fontAlgn="base" hangingPunct="0">
+              <a:spcBef>
+                <a:spcPct val="0"/>
+              </a:spcBef>
+              <a:spcAft>
+                <a:spcPct val="0"/>
+              </a:spcAft>
+              <a:defRPr>
+                <a:solidFill>
+                  <a:schemeClr val="tx1"/>
+                </a:solidFill>
+                <a:latin typeface="Calibri" panose="020F0502020204030204" pitchFamily="34" charset="0"/>
+              </a:defRPr>
+            </a:lvl8pPr>
+            <a:lvl9pPr marL="3886200" indent="-228600" eaLnBrk="0" fontAlgn="base" hangingPunct="0">
+              <a:spcBef>
+                <a:spcPct val="0"/>
+              </a:spcBef>
+              <a:spcAft>
+                <a:spcPct val="0"/>
+              </a:spcAft>
+              <a:defRPr>
+                <a:solidFill>
+                  <a:schemeClr val="tx1"/>
+                </a:solidFill>
+                <a:latin typeface="Calibri" panose="020F0502020204030204" pitchFamily="34" charset="0"/>
+              </a:defRPr>
+            </a:lvl9pPr>
+          </a:lstStyle>
+          <a:p>
+            <a:pPr algn="ctr" eaLnBrk="1" hangingPunct="1"/>
+            <a:r>
+              <a:rPr lang="en-US" altLang="en-US" sz="1100" i="1" dirty="0">
+                <a:solidFill>
+                  <a:srgbClr val="000000"/>
+                </a:solidFill>
+                <a:latin typeface="Arial" panose="020B0604020202020204" pitchFamily="34" charset="0"/>
+                <a:cs typeface="Arial" panose="020B0604020202020204" pitchFamily="34" charset="0"/>
+              </a:rPr>
+              <a:t>Git merge</a:t>
+            </a:r>
+          </a:p>
+        </p:txBody>
+      </p:sp>
+      <p:cxnSp>
+        <p:nvCxnSpPr>
+          <p:cNvPr id="142" name="Connector: Elbow 141">
+            <a:extLst>
+              <a:ext uri="{FF2B5EF4-FFF2-40B4-BE49-F238E27FC236}">
+                <a16:creationId xmlns:a16="http://schemas.microsoft.com/office/drawing/2014/main" id="{65358B71-4CB6-4446-92C3-0EC6A17EA404}"/>
+              </a:ext>
+            </a:extLst>
+          </p:cNvPr>
+          <p:cNvCxnSpPr>
+            <a:cxnSpLocks/>
+            <a:stCxn id="79" idx="2"/>
+            <a:endCxn id="23" idx="2"/>
+          </p:cNvCxnSpPr>
+          <p:nvPr/>
+        </p:nvCxnSpPr>
+        <p:spPr>
+          <a:xfrm rot="5400000">
+            <a:off x="6526420" y="1235154"/>
+            <a:ext cx="200055" cy="7589345"/>
+          </a:xfrm>
+          <a:prstGeom prst="bentConnector3">
+            <a:avLst>
+              <a:gd name="adj1" fmla="val 1205399"/>
+            </a:avLst>
+          </a:prstGeom>
+          <a:ln w="12700">
+            <a:solidFill>
+              <a:srgbClr val="545B64"/>
+            </a:solidFill>
+            <a:tailEnd type="arrow" w="med" len="sm"/>
+          </a:ln>
+        </p:spPr>
+        <p:style>
+          <a:lnRef idx="1">
+            <a:schemeClr val="accent1"/>
+          </a:lnRef>
+          <a:fillRef idx="0">
+            <a:schemeClr val="accent1"/>
+          </a:fillRef>
+          <a:effectRef idx="0">
+            <a:schemeClr val="accent1"/>
+          </a:effectRef>
+          <a:fontRef idx="minor">
+            <a:schemeClr val="tx1"/>
+          </a:fontRef>
+        </p:style>
+      </p:cxnSp>
+      <p:pic>
+        <p:nvPicPr>
+          <p:cNvPr id="42" name="Graphic 14">
+            <a:extLst>
+              <a:ext uri="{FF2B5EF4-FFF2-40B4-BE49-F238E27FC236}">
+                <a16:creationId xmlns:a16="http://schemas.microsoft.com/office/drawing/2014/main" id="{883AA87B-70FB-4020-9D37-5DE53A03A17F}"/>
+              </a:ext>
+            </a:extLst>
+          </p:cNvPr>
+          <p:cNvPicPr>
+            <a:picLocks noChangeAspect="1" noChangeArrowheads="1"/>
+          </p:cNvPicPr>
+          <p:nvPr/>
+        </p:nvPicPr>
+        <p:blipFill>
+          <a:blip r:embed="rId12">
+            <a:extLst>
+              <a:ext uri="{96DAC541-7B7A-43D3-8B79-37D633B846F1}">
+                <asvg:svgBlip xmlns:asvg="http://schemas.microsoft.com/office/drawing/2016/SVG/main" r:embed="rId13"/>
+              </a:ext>
+            </a:extLst>
+          </a:blip>
+          <a:srcRect/>
+          <a:stretch/>
+        </p:blipFill>
+        <p:spPr bwMode="auto">
+          <a:xfrm>
+            <a:off x="2589830" y="4155673"/>
+            <a:ext cx="469900" cy="469900"/>
+          </a:xfrm>
+          <a:prstGeom prst="rect">
+            <a:avLst/>
+          </a:prstGeom>
+          <a:noFill/>
+          <a:ln>
+            <a:noFill/>
+          </a:ln>
+          <a:extLst>
+            <a:ext uri="{909E8E84-426E-40DD-AFC4-6F175D3DCCD1}">
+              <a14:hiddenFill xmlns:a14="http://schemas.microsoft.com/office/drawing/2010/main">
+                <a:solidFill>
+                  <a:srgbClr val="FFFFFF"/>
+                </a:solidFill>
+              </a14:hiddenFill>
+            </a:ext>
+            <a:ext uri="{91240B29-F687-4F45-9708-019B960494DF}">
+              <a14:hiddenLine xmlns:a14="http://schemas.microsoft.com/office/drawing/2010/main" w="9525">
+                <a:solidFill>
+                  <a:srgbClr val="000000"/>
+                </a:solidFill>
+                <a:miter lim="800000"/>
+                <a:headEnd/>
+                <a:tailEnd/>
+              </a14:hiddenLine>
+            </a:ext>
+          </a:extLst>
+        </p:spPr>
+      </p:pic>
+      <p:pic>
+        <p:nvPicPr>
+          <p:cNvPr id="43" name="Graphic 19">
+            <a:extLst>
+              <a:ext uri="{FF2B5EF4-FFF2-40B4-BE49-F238E27FC236}">
+                <a16:creationId xmlns:a16="http://schemas.microsoft.com/office/drawing/2014/main" id="{93FFB869-9605-4CBA-A573-8EF8A785C024}"/>
+              </a:ext>
+            </a:extLst>
+          </p:cNvPr>
+          <p:cNvPicPr>
+            <a:picLocks noChangeAspect="1" noChangeArrowheads="1"/>
+          </p:cNvPicPr>
+          <p:nvPr/>
+        </p:nvPicPr>
+        <p:blipFill>
+          <a:blip r:embed="rId14">
+            <a:extLst>
+              <a:ext uri="{28A0092B-C50C-407E-A947-70E740481C1C}">
+                <a14:useLocalDpi xmlns:a14="http://schemas.microsoft.com/office/drawing/2010/main" val="0"/>
+              </a:ext>
+            </a:extLst>
+          </a:blip>
+          <a:srcRect/>
+          <a:stretch>
+            <a:fillRect/>
+          </a:stretch>
+        </p:blipFill>
+        <p:spPr bwMode="auto">
+          <a:xfrm>
+            <a:off x="7134072" y="4155787"/>
+            <a:ext cx="762000" cy="762000"/>
+          </a:xfrm>
+          <a:prstGeom prst="rect">
+            <a:avLst/>
+          </a:prstGeom>
+          <a:noFill/>
+          <a:ln>
+            <a:noFill/>
+          </a:ln>
+          <a:extLst>
+            <a:ext uri="{909E8E84-426E-40DD-AFC4-6F175D3DCCD1}">
+              <a14:hiddenFill xmlns:a14="http://schemas.microsoft.com/office/drawing/2010/main">
+                <a:solidFill>
+                  <a:srgbClr val="FFFFFF"/>
+                </a:solidFill>
+              </a14:hiddenFill>
+            </a:ext>
+            <a:ext uri="{91240B29-F687-4F45-9708-019B960494DF}">
+              <a14:hiddenLine xmlns:a14="http://schemas.microsoft.com/office/drawing/2010/main" w="9525">
+                <a:solidFill>
+                  <a:srgbClr val="000000"/>
+                </a:solidFill>
+                <a:miter lim="800000"/>
+                <a:headEnd/>
+                <a:tailEnd/>
+              </a14:hiddenLine>
+            </a:ext>
+          </a:extLst>
+        </p:spPr>
+      </p:pic>
+      <p:sp>
+        <p:nvSpPr>
+          <p:cNvPr id="44" name="TextBox 11">
+            <a:extLst>
+              <a:ext uri="{FF2B5EF4-FFF2-40B4-BE49-F238E27FC236}">
+                <a16:creationId xmlns:a16="http://schemas.microsoft.com/office/drawing/2014/main" id="{6E994CED-AA1B-4E2E-BEDD-A47130CB033F}"/>
+              </a:ext>
+            </a:extLst>
+          </p:cNvPr>
+          <p:cNvSpPr txBox="1">
+            <a:spLocks noChangeArrowheads="1"/>
+          </p:cNvSpPr>
+          <p:nvPr/>
+        </p:nvSpPr>
+        <p:spPr bwMode="auto">
+          <a:xfrm>
+            <a:off x="6368897" y="4924159"/>
+            <a:ext cx="2292350" cy="276999"/>
+          </a:xfrm>
+          <a:prstGeom prst="rect">
+            <a:avLst/>
+          </a:prstGeom>
+          <a:noFill/>
+          <a:ln>
+            <a:noFill/>
+          </a:ln>
+          <a:extLst>
+            <a:ext uri="{909E8E84-426E-40DD-AFC4-6F175D3DCCD1}">
+              <a14:hiddenFill xmlns:a14="http://schemas.microsoft.com/office/drawing/2010/main">
+                <a:solidFill>
+                  <a:srgbClr val="FFFFFF"/>
+                </a:solidFill>
+              </a14:hiddenFill>
+            </a:ext>
+            <a:ext uri="{91240B29-F687-4F45-9708-019B960494DF}">
+              <a14:hiddenLine xmlns:a14="http://schemas.microsoft.com/office/drawing/2010/main" w="9525">
+                <a:solidFill>
+                  <a:srgbClr val="000000"/>
+                </a:solidFill>
+                <a:miter lim="800000"/>
+                <a:headEnd/>
+                <a:tailEnd/>
+              </a14:hiddenLine>
+            </a:ext>
+          </a:extLst>
+        </p:spPr>
+        <p:txBody>
+          <a:bodyPr>
+            <a:spAutoFit/>
+          </a:bodyPr>
+          <a:lstStyle>
+            <a:lvl1pPr>
+              <a:defRPr>
+                <a:solidFill>
+                  <a:schemeClr val="tx1"/>
+                </a:solidFill>
+                <a:latin typeface="Calibri" panose="020F0502020204030204" pitchFamily="34" charset="0"/>
+              </a:defRPr>
+            </a:lvl1pPr>
+            <a:lvl2pPr marL="742950" indent="-285750">
+              <a:defRPr>
+                <a:solidFill>
+                  <a:schemeClr val="tx1"/>
+                </a:solidFill>
+                <a:latin typeface="Calibri" panose="020F0502020204030204" pitchFamily="34" charset="0"/>
+              </a:defRPr>
+            </a:lvl2pPr>
+            <a:lvl3pPr marL="1143000" indent="-228600">
+              <a:defRPr>
+                <a:solidFill>
+                  <a:schemeClr val="tx1"/>
+                </a:solidFill>
+                <a:latin typeface="Calibri" panose="020F0502020204030204" pitchFamily="34" charset="0"/>
+              </a:defRPr>
+            </a:lvl3pPr>
+            <a:lvl4pPr marL="1600200" indent="-228600">
+              <a:defRPr>
+                <a:solidFill>
+                  <a:schemeClr val="tx1"/>
+                </a:solidFill>
+                <a:latin typeface="Calibri" panose="020F0502020204030204" pitchFamily="34" charset="0"/>
+              </a:defRPr>
+            </a:lvl4pPr>
+            <a:lvl5pPr marL="2057400" indent="-228600">
+              <a:defRPr>
+                <a:solidFill>
+                  <a:schemeClr val="tx1"/>
+                </a:solidFill>
+                <a:latin typeface="Calibri" panose="020F0502020204030204" pitchFamily="34" charset="0"/>
+              </a:defRPr>
+            </a:lvl5pPr>
+            <a:lvl6pPr marL="2514600" indent="-228600" eaLnBrk="0" fontAlgn="base" hangingPunct="0">
+              <a:spcBef>
+                <a:spcPct val="0"/>
+              </a:spcBef>
+              <a:spcAft>
+                <a:spcPct val="0"/>
+              </a:spcAft>
+              <a:defRPr>
+                <a:solidFill>
+                  <a:schemeClr val="tx1"/>
+                </a:solidFill>
+                <a:latin typeface="Calibri" panose="020F0502020204030204" pitchFamily="34" charset="0"/>
+              </a:defRPr>
+            </a:lvl6pPr>
+            <a:lvl7pPr marL="2971800" indent="-228600" eaLnBrk="0" fontAlgn="base" hangingPunct="0">
+              <a:spcBef>
+                <a:spcPct val="0"/>
+              </a:spcBef>
+              <a:spcAft>
+                <a:spcPct val="0"/>
+              </a:spcAft>
+              <a:defRPr>
+                <a:solidFill>
+                  <a:schemeClr val="tx1"/>
+                </a:solidFill>
+                <a:latin typeface="Calibri" panose="020F0502020204030204" pitchFamily="34" charset="0"/>
+              </a:defRPr>
+            </a:lvl7pPr>
+            <a:lvl8pPr marL="3429000" indent="-228600" eaLnBrk="0" fontAlgn="base" hangingPunct="0">
+              <a:spcBef>
+                <a:spcPct val="0"/>
+              </a:spcBef>
+              <a:spcAft>
+                <a:spcPct val="0"/>
+              </a:spcAft>
+              <a:defRPr>
+                <a:solidFill>
+                  <a:schemeClr val="tx1"/>
+                </a:solidFill>
+                <a:latin typeface="Calibri" panose="020F0502020204030204" pitchFamily="34" charset="0"/>
+              </a:defRPr>
+            </a:lvl8pPr>
+            <a:lvl9pPr marL="3886200" indent="-228600" eaLnBrk="0" fontAlgn="base" hangingPunct="0">
+              <a:spcBef>
+                <a:spcPct val="0"/>
+              </a:spcBef>
+              <a:spcAft>
+                <a:spcPct val="0"/>
+              </a:spcAft>
+              <a:defRPr>
+                <a:solidFill>
+                  <a:schemeClr val="tx1"/>
+                </a:solidFill>
+                <a:latin typeface="Calibri" panose="020F0502020204030204" pitchFamily="34" charset="0"/>
+              </a:defRPr>
+            </a:lvl9pPr>
+          </a:lstStyle>
+          <a:p>
+            <a:pPr algn="ctr" eaLnBrk="1" hangingPunct="1"/>
+            <a:r>
+              <a:rPr lang="en-US" altLang="en-US" sz="1200" dirty="0">
+                <a:latin typeface="Arial" panose="020B0604020202020204" pitchFamily="34" charset="0"/>
+                <a:ea typeface="Amazon Ember" panose="020B0603020204020204" pitchFamily="34" charset="0"/>
+                <a:cs typeface="Arial" panose="020B0604020202020204" pitchFamily="34" charset="0"/>
+              </a:rPr>
+              <a:t>AWS CodeBuild</a:t>
+            </a:r>
+          </a:p>
+        </p:txBody>
+      </p:sp>
+      <p:pic>
+        <p:nvPicPr>
+          <p:cNvPr id="20" name="Picture 19">
+            <a:extLst>
+              <a:ext uri="{FF2B5EF4-FFF2-40B4-BE49-F238E27FC236}">
+                <a16:creationId xmlns:a16="http://schemas.microsoft.com/office/drawing/2014/main" id="{6E974154-0067-4F36-8423-8FA45D783A75}"/>
+              </a:ext>
+            </a:extLst>
+          </p:cNvPr>
+          <p:cNvPicPr>
+            <a:picLocks noChangeAspect="1"/>
+          </p:cNvPicPr>
+          <p:nvPr/>
+        </p:nvPicPr>
+        <p:blipFill>
+          <a:blip r:embed="rId15">
+            <a:extLst>
+              <a:ext uri="{28A0092B-C50C-407E-A947-70E740481C1C}">
+                <a14:useLocalDpi xmlns:a14="http://schemas.microsoft.com/office/drawing/2010/main" val="0"/>
+              </a:ext>
+            </a:extLst>
+          </a:blip>
+          <a:stretch>
+            <a:fillRect/>
+          </a:stretch>
+        </p:blipFill>
+        <p:spPr>
+          <a:xfrm>
+            <a:off x="8044815" y="3958272"/>
+            <a:ext cx="1157031" cy="1157031"/>
+          </a:xfrm>
+          <a:prstGeom prst="rect">
+            <a:avLst/>
+          </a:prstGeom>
+        </p:spPr>
+      </p:pic>
+      <p:sp>
+        <p:nvSpPr>
+          <p:cNvPr id="55" name="TextBox 11">
+            <a:extLst>
+              <a:ext uri="{FF2B5EF4-FFF2-40B4-BE49-F238E27FC236}">
+                <a16:creationId xmlns:a16="http://schemas.microsoft.com/office/drawing/2014/main" id="{AA9394C2-A507-46D1-B261-012904BD7F14}"/>
+              </a:ext>
+            </a:extLst>
+          </p:cNvPr>
+          <p:cNvSpPr txBox="1">
+            <a:spLocks noChangeArrowheads="1"/>
+          </p:cNvSpPr>
+          <p:nvPr/>
+        </p:nvSpPr>
+        <p:spPr bwMode="auto">
+          <a:xfrm>
+            <a:off x="7500593" y="4911832"/>
+            <a:ext cx="2292350" cy="276999"/>
+          </a:xfrm>
+          <a:prstGeom prst="rect">
+            <a:avLst/>
+          </a:prstGeom>
+          <a:noFill/>
+          <a:ln>
+            <a:noFill/>
+          </a:ln>
+          <a:extLst>
+            <a:ext uri="{909E8E84-426E-40DD-AFC4-6F175D3DCCD1}">
+              <a14:hiddenFill xmlns:a14="http://schemas.microsoft.com/office/drawing/2010/main">
+                <a:solidFill>
+                  <a:srgbClr val="FFFFFF"/>
+                </a:solidFill>
+              </a14:hiddenFill>
+            </a:ext>
+            <a:ext uri="{91240B29-F687-4F45-9708-019B960494DF}">
+              <a14:hiddenLine xmlns:a14="http://schemas.microsoft.com/office/drawing/2010/main" w="9525">
+                <a:solidFill>
+                  <a:srgbClr val="000000"/>
+                </a:solidFill>
+                <a:miter lim="800000"/>
+                <a:headEnd/>
+                <a:tailEnd/>
+              </a14:hiddenLine>
+            </a:ext>
+          </a:extLst>
+        </p:spPr>
+        <p:txBody>
+          <a:bodyPr>
+            <a:spAutoFit/>
+          </a:bodyPr>
+          <a:lstStyle>
+            <a:lvl1pPr>
+              <a:defRPr>
+                <a:solidFill>
+                  <a:schemeClr val="tx1"/>
+                </a:solidFill>
+                <a:latin typeface="Calibri" panose="020F0502020204030204" pitchFamily="34" charset="0"/>
+              </a:defRPr>
+            </a:lvl1pPr>
+            <a:lvl2pPr marL="742950" indent="-285750">
+              <a:defRPr>
+                <a:solidFill>
+                  <a:schemeClr val="tx1"/>
+                </a:solidFill>
+                <a:latin typeface="Calibri" panose="020F0502020204030204" pitchFamily="34" charset="0"/>
+              </a:defRPr>
+            </a:lvl2pPr>
+            <a:lvl3pPr marL="1143000" indent="-228600">
+              <a:defRPr>
+                <a:solidFill>
+                  <a:schemeClr val="tx1"/>
+                </a:solidFill>
+                <a:latin typeface="Calibri" panose="020F0502020204030204" pitchFamily="34" charset="0"/>
+              </a:defRPr>
+            </a:lvl3pPr>
+            <a:lvl4pPr marL="1600200" indent="-228600">
+              <a:defRPr>
+                <a:solidFill>
+                  <a:schemeClr val="tx1"/>
+                </a:solidFill>
+                <a:latin typeface="Calibri" panose="020F0502020204030204" pitchFamily="34" charset="0"/>
+              </a:defRPr>
+            </a:lvl4pPr>
+            <a:lvl5pPr marL="2057400" indent="-228600">
+              <a:defRPr>
+                <a:solidFill>
+                  <a:schemeClr val="tx1"/>
+                </a:solidFill>
+                <a:latin typeface="Calibri" panose="020F0502020204030204" pitchFamily="34" charset="0"/>
+              </a:defRPr>
+            </a:lvl5pPr>
+            <a:lvl6pPr marL="2514600" indent="-228600" eaLnBrk="0" fontAlgn="base" hangingPunct="0">
+              <a:spcBef>
+                <a:spcPct val="0"/>
+              </a:spcBef>
+              <a:spcAft>
+                <a:spcPct val="0"/>
+              </a:spcAft>
+              <a:defRPr>
+                <a:solidFill>
+                  <a:schemeClr val="tx1"/>
+                </a:solidFill>
+                <a:latin typeface="Calibri" panose="020F0502020204030204" pitchFamily="34" charset="0"/>
+              </a:defRPr>
+            </a:lvl6pPr>
+            <a:lvl7pPr marL="2971800" indent="-228600" eaLnBrk="0" fontAlgn="base" hangingPunct="0">
+              <a:spcBef>
+                <a:spcPct val="0"/>
+              </a:spcBef>
+              <a:spcAft>
+                <a:spcPct val="0"/>
+              </a:spcAft>
+              <a:defRPr>
+                <a:solidFill>
+                  <a:schemeClr val="tx1"/>
+                </a:solidFill>
+                <a:latin typeface="Calibri" panose="020F0502020204030204" pitchFamily="34" charset="0"/>
+              </a:defRPr>
+            </a:lvl7pPr>
+            <a:lvl8pPr marL="3429000" indent="-228600" eaLnBrk="0" fontAlgn="base" hangingPunct="0">
+              <a:spcBef>
+                <a:spcPct val="0"/>
+              </a:spcBef>
+              <a:spcAft>
+                <a:spcPct val="0"/>
+              </a:spcAft>
+              <a:defRPr>
+                <a:solidFill>
+                  <a:schemeClr val="tx1"/>
+                </a:solidFill>
+                <a:latin typeface="Calibri" panose="020F0502020204030204" pitchFamily="34" charset="0"/>
+              </a:defRPr>
+            </a:lvl8pPr>
+            <a:lvl9pPr marL="3886200" indent="-228600" eaLnBrk="0" fontAlgn="base" hangingPunct="0">
+              <a:spcBef>
+                <a:spcPct val="0"/>
+              </a:spcBef>
+              <a:spcAft>
+                <a:spcPct val="0"/>
+              </a:spcAft>
+              <a:defRPr>
+                <a:solidFill>
+                  <a:schemeClr val="tx1"/>
+                </a:solidFill>
+                <a:latin typeface="Calibri" panose="020F0502020204030204" pitchFamily="34" charset="0"/>
+              </a:defRPr>
+            </a:lvl9pPr>
+          </a:lstStyle>
+          <a:p>
+            <a:pPr algn="ctr" eaLnBrk="1" hangingPunct="1"/>
+            <a:r>
+              <a:rPr lang="en-US" altLang="en-US" sz="1200" dirty="0" err="1">
+                <a:latin typeface="Arial" panose="020B0604020202020204" pitchFamily="34" charset="0"/>
+                <a:ea typeface="Amazon Ember" panose="020B0603020204020204" pitchFamily="34" charset="0"/>
+                <a:cs typeface="Arial" panose="020B0604020202020204" pitchFamily="34" charset="0"/>
+              </a:rPr>
+              <a:t>TaskCat</a:t>
+            </a:r>
+            <a:endParaRPr lang="en-US" altLang="en-US" sz="1200" dirty="0">
+              <a:latin typeface="Arial" panose="020B0604020202020204" pitchFamily="34" charset="0"/>
+              <a:ea typeface="Amazon Ember" panose="020B0603020204020204" pitchFamily="34" charset="0"/>
+              <a:cs typeface="Arial" panose="020B0604020202020204" pitchFamily="34" charset="0"/>
+            </a:endParaRPr>
+          </a:p>
+        </p:txBody>
+      </p:sp>
+      <p:cxnSp>
+        <p:nvCxnSpPr>
+          <p:cNvPr id="61" name="Straight Arrow Connector 60">
+            <a:extLst>
+              <a:ext uri="{FF2B5EF4-FFF2-40B4-BE49-F238E27FC236}">
+                <a16:creationId xmlns:a16="http://schemas.microsoft.com/office/drawing/2014/main" id="{BF90D87F-AE4A-4469-A562-FE58A4694DEB}"/>
+              </a:ext>
+            </a:extLst>
+          </p:cNvPr>
+          <p:cNvCxnSpPr>
+            <a:cxnSpLocks/>
+            <a:stCxn id="43" idx="0"/>
+            <a:endCxn id="40" idx="2"/>
+          </p:cNvCxnSpPr>
+          <p:nvPr/>
+        </p:nvCxnSpPr>
+        <p:spPr>
+          <a:xfrm flipV="1">
+            <a:off x="7515072" y="3860751"/>
+            <a:ext cx="0" cy="295036"/>
+          </a:xfrm>
+          <a:prstGeom prst="straightConnector1">
+            <a:avLst/>
+          </a:prstGeom>
+          <a:ln w="12700">
+            <a:solidFill>
+              <a:srgbClr val="545B64"/>
+            </a:solidFill>
+            <a:headEnd type="none" w="med" len="sm"/>
+            <a:tailEnd type="arrow" w="med" len="sm"/>
+          </a:ln>
+        </p:spPr>
+        <p:style>
+          <a:lnRef idx="1">
+            <a:schemeClr val="accent1"/>
+          </a:lnRef>
+          <a:fillRef idx="0">
+            <a:schemeClr val="accent1"/>
+          </a:fillRef>
+          <a:effectRef idx="0">
+            <a:schemeClr val="accent1"/>
+          </a:effectRef>
+          <a:fontRef idx="minor">
+            <a:schemeClr val="tx1"/>
+          </a:fontRef>
+        </p:style>
+      </p:cxnSp>
+      <p:cxnSp>
+        <p:nvCxnSpPr>
+          <p:cNvPr id="62" name="Straight Arrow Connector 61">
+            <a:extLst>
+              <a:ext uri="{FF2B5EF4-FFF2-40B4-BE49-F238E27FC236}">
+                <a16:creationId xmlns:a16="http://schemas.microsoft.com/office/drawing/2014/main" id="{4EAD81DA-C731-4A9C-9D44-9B6C57B6FDBD}"/>
+              </a:ext>
+            </a:extLst>
+          </p:cNvPr>
+          <p:cNvCxnSpPr>
+            <a:cxnSpLocks/>
+            <a:stCxn id="43" idx="3"/>
+          </p:cNvCxnSpPr>
+          <p:nvPr/>
+        </p:nvCxnSpPr>
+        <p:spPr>
+          <a:xfrm flipV="1">
+            <a:off x="7896072" y="4534839"/>
+            <a:ext cx="489536" cy="1948"/>
+          </a:xfrm>
+          <a:prstGeom prst="straightConnector1">
+            <a:avLst/>
+          </a:prstGeom>
+          <a:ln w="12700">
+            <a:solidFill>
+              <a:srgbClr val="545B64"/>
+            </a:solidFill>
+            <a:headEnd type="none" w="med" len="sm"/>
+            <a:tailEnd type="arrow" w="med" len="sm"/>
+          </a:ln>
+        </p:spPr>
+        <p:style>
+          <a:lnRef idx="1">
+            <a:schemeClr val="accent1"/>
+          </a:lnRef>
+          <a:fillRef idx="0">
+            <a:schemeClr val="accent1"/>
+          </a:fillRef>
+          <a:effectRef idx="0">
+            <a:schemeClr val="accent1"/>
+          </a:effectRef>
+          <a:fontRef idx="minor">
+            <a:schemeClr val="tx1"/>
+          </a:fontRef>
+        </p:style>
+      </p:cxnSp>
+      <p:cxnSp>
+        <p:nvCxnSpPr>
+          <p:cNvPr id="65" name="Straight Arrow Connector 64">
+            <a:extLst>
+              <a:ext uri="{FF2B5EF4-FFF2-40B4-BE49-F238E27FC236}">
+                <a16:creationId xmlns:a16="http://schemas.microsoft.com/office/drawing/2014/main" id="{36E00647-3D80-4928-95E0-3D16F1E10FA5}"/>
+              </a:ext>
+            </a:extLst>
+          </p:cNvPr>
+          <p:cNvCxnSpPr>
+            <a:cxnSpLocks/>
+            <a:stCxn id="44" idx="2"/>
+            <a:endCxn id="38" idx="0"/>
+          </p:cNvCxnSpPr>
+          <p:nvPr/>
+        </p:nvCxnSpPr>
+        <p:spPr>
+          <a:xfrm>
+            <a:off x="7515072" y="5201158"/>
+            <a:ext cx="0" cy="358507"/>
+          </a:xfrm>
+          <a:prstGeom prst="straightConnector1">
+            <a:avLst/>
+          </a:prstGeom>
+          <a:ln w="12700">
+            <a:solidFill>
+              <a:srgbClr val="545B64"/>
+            </a:solidFill>
+            <a:headEnd type="none" w="med" len="sm"/>
+            <a:tailEnd type="arrow" w="med" len="sm"/>
+          </a:ln>
+        </p:spPr>
+        <p:style>
+          <a:lnRef idx="1">
+            <a:schemeClr val="accent1"/>
+          </a:lnRef>
+          <a:fillRef idx="0">
+            <a:schemeClr val="accent1"/>
+          </a:fillRef>
+          <a:effectRef idx="0">
+            <a:schemeClr val="accent1"/>
+          </a:effectRef>
+          <a:fontRef idx="minor">
+            <a:schemeClr val="tx1"/>
+          </a:fontRef>
+        </p:style>
+      </p:cxnSp>
+      <p:sp>
+        <p:nvSpPr>
+          <p:cNvPr id="70" name="Freeform 36">
+            <a:extLst>
+              <a:ext uri="{FF2B5EF4-FFF2-40B4-BE49-F238E27FC236}">
+                <a16:creationId xmlns:a16="http://schemas.microsoft.com/office/drawing/2014/main" id="{792CBBAF-5A9D-41BE-BC5A-CE536A63B3E3}"/>
+              </a:ext>
+            </a:extLst>
+          </p:cNvPr>
+          <p:cNvSpPr/>
+          <p:nvPr/>
+        </p:nvSpPr>
+        <p:spPr>
+          <a:xfrm rot="10800000" flipH="1">
+            <a:off x="7769763" y="5162096"/>
+            <a:ext cx="877005" cy="638221"/>
+          </a:xfrm>
+          <a:custGeom>
+            <a:avLst/>
+            <a:gdLst>
+              <a:gd name="connsiteX0" fmla="*/ 1371600 w 1371600"/>
+              <a:gd name="connsiteY0" fmla="*/ 711200 h 711200"/>
+              <a:gd name="connsiteX1" fmla="*/ 1371600 w 1371600"/>
+              <a:gd name="connsiteY1" fmla="*/ 0 h 711200"/>
+              <a:gd name="connsiteX2" fmla="*/ 0 w 1371600"/>
+              <a:gd name="connsiteY2" fmla="*/ 0 h 711200"/>
+            </a:gdLst>
+            <a:ahLst/>
+            <a:cxnLst>
+              <a:cxn ang="0">
+                <a:pos x="connsiteX0" y="connsiteY0"/>
+              </a:cxn>
+              <a:cxn ang="0">
+                <a:pos x="connsiteX1" y="connsiteY1"/>
+              </a:cxn>
+              <a:cxn ang="0">
+                <a:pos x="connsiteX2" y="connsiteY2"/>
+              </a:cxn>
+            </a:cxnLst>
+            <a:rect l="l" t="t" r="r" b="b"/>
+            <a:pathLst>
+              <a:path w="1371600" h="711200">
+                <a:moveTo>
+                  <a:pt x="1371600" y="711200"/>
+                </a:moveTo>
+                <a:lnTo>
+                  <a:pt x="1371600" y="0"/>
+                </a:lnTo>
+                <a:lnTo>
+                  <a:pt x="0" y="0"/>
+                </a:lnTo>
+              </a:path>
+            </a:pathLst>
+          </a:custGeom>
+          <a:noFill/>
+          <a:ln w="12700">
+            <a:solidFill>
+              <a:schemeClr val="tx2"/>
+            </a:solidFill>
+            <a:headEnd type="none" w="med" len="sm"/>
+            <a:tailEnd type="arrow" w="med" len="sm"/>
+          </a:ln>
+        </p:spPr>
+        <p:style>
+          <a:lnRef idx="2">
+            <a:schemeClr val="accent1">
+              <a:shade val="50000"/>
+            </a:schemeClr>
+          </a:lnRef>
+          <a:fillRef idx="1">
+            <a:schemeClr val="accent1"/>
+          </a:fillRef>
+          <a:effectRef idx="0">
+            <a:schemeClr val="accent1"/>
+          </a:effectRef>
+          <a:fontRef idx="minor">
+            <a:schemeClr val="lt1"/>
+          </a:fontRef>
+        </p:style>
+        <p:txBody>
+          <a:bodyPr anchor="ctr"/>
+          <a:lstStyle/>
+          <a:p>
+            <a:pPr algn="ctr" eaLnBrk="1" fontAlgn="auto" hangingPunct="1">
+              <a:spcBef>
+                <a:spcPts val="0"/>
+              </a:spcBef>
+              <a:spcAft>
+                <a:spcPts val="0"/>
+              </a:spcAft>
+              <a:defRPr/>
+            </a:pPr>
+            <a:endParaRPr lang="en-US" dirty="0"/>
+          </a:p>
+        </p:txBody>
+      </p:sp>
+      <p:sp>
+        <p:nvSpPr>
+          <p:cNvPr id="79" name="TextBox 17">
+            <a:extLst>
+              <a:ext uri="{FF2B5EF4-FFF2-40B4-BE49-F238E27FC236}">
+                <a16:creationId xmlns:a16="http://schemas.microsoft.com/office/drawing/2014/main" id="{8B0497F2-B93C-4027-B660-AD8A487D8896}"/>
+              </a:ext>
+            </a:extLst>
+          </p:cNvPr>
+          <p:cNvSpPr txBox="1">
+            <a:spLocks noChangeArrowheads="1"/>
+          </p:cNvSpPr>
+          <p:nvPr/>
+        </p:nvSpPr>
+        <p:spPr bwMode="auto">
+          <a:xfrm>
+            <a:off x="9740082" y="4668189"/>
+            <a:ext cx="1362074" cy="261610"/>
+          </a:xfrm>
+          <a:prstGeom prst="rect">
+            <a:avLst/>
+          </a:prstGeom>
+          <a:noFill/>
+          <a:ln>
+            <a:noFill/>
+          </a:ln>
+          <a:extLst>
+            <a:ext uri="{909E8E84-426E-40DD-AFC4-6F175D3DCCD1}">
+              <a14:hiddenFill xmlns:a14="http://schemas.microsoft.com/office/drawing/2010/main">
+                <a:solidFill>
+                  <a:srgbClr val="FFFFFF"/>
+                </a:solidFill>
+              </a14:hiddenFill>
+            </a:ext>
+            <a:ext uri="{91240B29-F687-4F45-9708-019B960494DF}">
+              <a14:hiddenLine xmlns:a14="http://schemas.microsoft.com/office/drawing/2010/main" w="9525">
+                <a:solidFill>
+                  <a:srgbClr val="000000"/>
+                </a:solidFill>
+                <a:miter lim="800000"/>
+                <a:headEnd/>
+                <a:tailEnd/>
+              </a14:hiddenLine>
+            </a:ext>
+          </a:extLst>
+        </p:spPr>
+        <p:txBody>
+          <a:bodyPr wrap="square">
+            <a:spAutoFit/>
+          </a:bodyPr>
+          <a:lstStyle>
+            <a:lvl1pPr>
+              <a:defRPr>
+                <a:solidFill>
+                  <a:schemeClr val="tx1"/>
+                </a:solidFill>
+                <a:latin typeface="Calibri" panose="020F0502020204030204" pitchFamily="34" charset="0"/>
+              </a:defRPr>
+            </a:lvl1pPr>
+            <a:lvl2pPr marL="742950" indent="-285750">
+              <a:defRPr>
+                <a:solidFill>
+                  <a:schemeClr val="tx1"/>
+                </a:solidFill>
+                <a:latin typeface="Calibri" panose="020F0502020204030204" pitchFamily="34" charset="0"/>
+              </a:defRPr>
+            </a:lvl2pPr>
+            <a:lvl3pPr marL="1143000" indent="-228600">
+              <a:defRPr>
+                <a:solidFill>
+                  <a:schemeClr val="tx1"/>
+                </a:solidFill>
+                <a:latin typeface="Calibri" panose="020F0502020204030204" pitchFamily="34" charset="0"/>
+              </a:defRPr>
+            </a:lvl3pPr>
+            <a:lvl4pPr marL="1600200" indent="-228600">
+              <a:defRPr>
+                <a:solidFill>
+                  <a:schemeClr val="tx1"/>
+                </a:solidFill>
+                <a:latin typeface="Calibri" panose="020F0502020204030204" pitchFamily="34" charset="0"/>
+              </a:defRPr>
+            </a:lvl4pPr>
+            <a:lvl5pPr marL="2057400" indent="-228600">
+              <a:defRPr>
+                <a:solidFill>
+                  <a:schemeClr val="tx1"/>
+                </a:solidFill>
+                <a:latin typeface="Calibri" panose="020F0502020204030204" pitchFamily="34" charset="0"/>
+              </a:defRPr>
+            </a:lvl5pPr>
+            <a:lvl6pPr marL="2514600" indent="-228600" eaLnBrk="0" fontAlgn="base" hangingPunct="0">
+              <a:spcBef>
+                <a:spcPct val="0"/>
+              </a:spcBef>
+              <a:spcAft>
+                <a:spcPct val="0"/>
+              </a:spcAft>
+              <a:defRPr>
+                <a:solidFill>
+                  <a:schemeClr val="tx1"/>
+                </a:solidFill>
+                <a:latin typeface="Calibri" panose="020F0502020204030204" pitchFamily="34" charset="0"/>
+              </a:defRPr>
+            </a:lvl6pPr>
+            <a:lvl7pPr marL="2971800" indent="-228600" eaLnBrk="0" fontAlgn="base" hangingPunct="0">
+              <a:spcBef>
+                <a:spcPct val="0"/>
+              </a:spcBef>
+              <a:spcAft>
+                <a:spcPct val="0"/>
+              </a:spcAft>
+              <a:defRPr>
+                <a:solidFill>
+                  <a:schemeClr val="tx1"/>
+                </a:solidFill>
+                <a:latin typeface="Calibri" panose="020F0502020204030204" pitchFamily="34" charset="0"/>
+              </a:defRPr>
+            </a:lvl7pPr>
+            <a:lvl8pPr marL="3429000" indent="-228600" eaLnBrk="0" fontAlgn="base" hangingPunct="0">
+              <a:spcBef>
+                <a:spcPct val="0"/>
+              </a:spcBef>
+              <a:spcAft>
+                <a:spcPct val="0"/>
+              </a:spcAft>
+              <a:defRPr>
+                <a:solidFill>
+                  <a:schemeClr val="tx1"/>
+                </a:solidFill>
+                <a:latin typeface="Calibri" panose="020F0502020204030204" pitchFamily="34" charset="0"/>
+              </a:defRPr>
+            </a:lvl8pPr>
+            <a:lvl9pPr marL="3886200" indent="-228600" eaLnBrk="0" fontAlgn="base" hangingPunct="0">
+              <a:spcBef>
+                <a:spcPct val="0"/>
+              </a:spcBef>
+              <a:spcAft>
+                <a:spcPct val="0"/>
+              </a:spcAft>
+              <a:defRPr>
+                <a:solidFill>
+                  <a:schemeClr val="tx1"/>
+                </a:solidFill>
+                <a:latin typeface="Calibri" panose="020F0502020204030204" pitchFamily="34" charset="0"/>
+              </a:defRPr>
+            </a:lvl9pPr>
+          </a:lstStyle>
+          <a:p>
+            <a:pPr algn="ctr" eaLnBrk="1" hangingPunct="1"/>
+            <a:r>
+              <a:rPr lang="en-US" altLang="en-US" sz="1100" dirty="0">
+                <a:latin typeface="Arial" panose="020B0604020202020204" pitchFamily="34" charset="0"/>
+                <a:ea typeface="Amazon Ember" panose="020B0603020204020204" pitchFamily="34" charset="0"/>
+                <a:cs typeface="Arial" panose="020B0604020202020204" pitchFamily="34" charset="0"/>
+              </a:rPr>
+              <a:t>Lambda function</a:t>
+            </a:r>
+          </a:p>
+        </p:txBody>
+      </p:sp>
+      <p:pic>
+        <p:nvPicPr>
+          <p:cNvPr id="80" name="Graphic 13">
+            <a:extLst>
+              <a:ext uri="{FF2B5EF4-FFF2-40B4-BE49-F238E27FC236}">
+                <a16:creationId xmlns:a16="http://schemas.microsoft.com/office/drawing/2014/main" id="{2F55D0B5-45C8-4A55-9BA1-526914EF90AC}"/>
+              </a:ext>
+            </a:extLst>
+          </p:cNvPr>
+          <p:cNvPicPr>
+            <a:picLocks noChangeAspect="1" noChangeArrowheads="1"/>
+          </p:cNvPicPr>
+          <p:nvPr/>
+        </p:nvPicPr>
+        <p:blipFill>
+          <a:blip r:embed="rId16">
+            <a:extLst>
+              <a:ext uri="{28A0092B-C50C-407E-A947-70E740481C1C}">
+                <a14:useLocalDpi xmlns:a14="http://schemas.microsoft.com/office/drawing/2010/main" val="0"/>
+              </a:ext>
+            </a:extLst>
+          </a:blip>
+          <a:srcRect/>
+          <a:stretch>
+            <a:fillRect/>
+          </a:stretch>
+        </p:blipFill>
+        <p:spPr bwMode="auto">
+          <a:xfrm>
+            <a:off x="10201008" y="4162023"/>
+            <a:ext cx="457200" cy="457200"/>
+          </a:xfrm>
+          <a:prstGeom prst="rect">
+            <a:avLst/>
+          </a:prstGeom>
+          <a:noFill/>
+          <a:ln>
+            <a:noFill/>
+          </a:ln>
+          <a:extLst>
+            <a:ext uri="{909E8E84-426E-40DD-AFC4-6F175D3DCCD1}">
+              <a14:hiddenFill xmlns:a14="http://schemas.microsoft.com/office/drawing/2010/main">
+                <a:solidFill>
+                  <a:srgbClr val="FFFFFF"/>
+                </a:solidFill>
+              </a14:hiddenFill>
+            </a:ext>
+            <a:ext uri="{91240B29-F687-4F45-9708-019B960494DF}">
+              <a14:hiddenLine xmlns:a14="http://schemas.microsoft.com/office/drawing/2010/main" w="9525">
+                <a:solidFill>
+                  <a:srgbClr val="000000"/>
+                </a:solidFill>
+                <a:miter lim="800000"/>
+                <a:headEnd/>
+                <a:tailEnd/>
+              </a14:hiddenLine>
+            </a:ext>
+          </a:extLst>
+        </p:spPr>
+      </p:pic>
+    </p:spTree>
+    <p:extLst>
+      <p:ext uri="{BB962C8B-B14F-4D97-AF65-F5344CB8AC3E}">
+        <p14:creationId xmlns:p14="http://schemas.microsoft.com/office/powerpoint/2010/main" val="756333888"/>
+      </p:ext>
+    </p:extLst>
+  </p:cSld>
+  <p:clrMapOvr>
+    <a:masterClrMapping/>
+  </p:clrMapOvr>
+</p:sld>
+</file>
+
+<file path=ppt/slides/slide4.xml><?xml version="1.0" encoding="utf-8"?>
+<p:sld xmlns:a="http://schemas.openxmlformats.org/drawingml/2006/main" xmlns:r="http://schemas.openxmlformats.org/officeDocument/2006/relationships" xmlns:p="http://schemas.openxmlformats.org/presentationml/2006/main">
+  <p:cSld>
+    <p:spTree>
+      <p:nvGrpSpPr>
+        <p:cNvPr id="1" name=""/>
+        <p:cNvGrpSpPr/>
+        <p:nvPr/>
+      </p:nvGrpSpPr>
+      <p:grpSpPr>
+        <a:xfrm>
+          <a:off x="0" y="0"/>
+          <a:ext cx="0" cy="0"/>
+          <a:chOff x="0" y="0"/>
+          <a:chExt cx="0" cy="0"/>
+        </a:xfrm>
+      </p:grpSpPr>
+    </p:spTree>
+    <p:extLst>
+      <p:ext uri="{BB962C8B-B14F-4D97-AF65-F5344CB8AC3E}">
+        <p14:creationId xmlns:p14="http://schemas.microsoft.com/office/powerpoint/2010/main" val="3316039659"/>
+      </p:ext>
+    </p:extLst>
+  </p:cSld>
+  <p:clrMapOvr>
+    <a:masterClrMapping/>
+  </p:clrMapOvr>
+</p:sld>
+</file>
+
 <file path=ppt/theme/theme1.xml><?xml version="1.0" encoding="utf-8"?>
 <a:theme xmlns:a="http://schemas.openxmlformats.org/drawingml/2006/main" name="Office Theme">
   <a:themeElements>

</xml_diff>